<commit_message>
🔧 Template system overhaul and validation implementation
- Implemented comprehensive built-in validation system (Markdown→JSON→Template→PPTX)
- Updated PowerPoint template placeholder names to remove _1 suffixes
- Fixed all structured frontmatter patterns to match clean field names
- Updated master presentation JSON to use consistent field naming
- Corrected SWOT Analysis to use proper quadrant field names
- Removed obsolete number_item placeholders from Agenda layout
- Added validation.py with strict pre/post generation checks
- Enhanced template management with systematic placeholder renaming
- Bumped version to 1.0.8
- Fixed all flake8 F-level errors and formatting issues
- Cleaned up root directory pollution

🤖 Generated with [Claude Code](https://claude.ai/code)

Co-Authored-By: Claude <noreply@anthropic.com>
</commit_message>
<xml_diff>
--- a/src/deckbuilder/assets/templates/default.pptx
+++ b/src/deckbuilder/assets/templates/default.pptx
@@ -131,7 +131,7 @@
       </p:grpSpPr>
       <p:sp>
         <p:nvSpPr>
-          <p:cNvPr id="2" name="title_top_1">
+          <p:cNvPr id="2" name="title_top">
             <a:extLst>
               <a:ext uri="{FF2B5EF4-FFF2-40B4-BE49-F238E27FC236}">
                 <a16:creationId xmlns:a16="http://schemas.microsoft.com/office/drawing/2014/main" id="{D9CE86E6-C782-BA2C-142C-EA8961D1A39E}"/>
@@ -168,7 +168,7 @@
       </p:sp>
       <p:sp>
         <p:nvSpPr>
-          <p:cNvPr id="3" name="subtitle_1">
+          <p:cNvPr id="3" name="subtitle">
             <a:extLst>
               <a:ext uri="{FF2B5EF4-FFF2-40B4-BE49-F238E27FC236}">
                 <a16:creationId xmlns:a16="http://schemas.microsoft.com/office/drawing/2014/main" id="{1F1E1204-8281-8730-94F6-02E56F6A3AD2}"/>
@@ -238,7 +238,7 @@
       </p:sp>
       <p:sp>
         <p:nvSpPr>
-          <p:cNvPr id="4" name="date_footer_1">
+          <p:cNvPr id="4" name="date_footer">
             <a:extLst>
               <a:ext uri="{FF2B5EF4-FFF2-40B4-BE49-F238E27FC236}">
                 <a16:creationId xmlns:a16="http://schemas.microsoft.com/office/drawing/2014/main" id="{74987493-71B7-952F-137D-CD94C357B137}"/>
@@ -259,7 +259,7 @@
           <a:p>
             <a:fld id="{EC529286-92C0-9541-AD8C-01D6C4AD1D19}" type="datetimeFigureOut">
               <a:rPr lang="en-US" smtClean="0"/>
-              <a:t>6/22/25</a:t>
+              <a:t>7/7/25</a:t>
             </a:fld>
             <a:endParaRPr lang="en-US"/>
           </a:p>
@@ -267,7 +267,7 @@
       </p:sp>
       <p:sp>
         <p:nvSpPr>
-          <p:cNvPr id="5" name="footer_footer_1">
+          <p:cNvPr id="5" name="footer_footer">
             <a:extLst>
               <a:ext uri="{FF2B5EF4-FFF2-40B4-BE49-F238E27FC236}">
                 <a16:creationId xmlns:a16="http://schemas.microsoft.com/office/drawing/2014/main" id="{37DAC790-71C1-FA16-F2D9-3F6A6980837D}"/>
@@ -292,7 +292,7 @@
       </p:sp>
       <p:sp>
         <p:nvSpPr>
-          <p:cNvPr id="6" name="slide_number_footer_1">
+          <p:cNvPr id="6" name="slide_number_footer">
             <a:extLst>
               <a:ext uri="{FF2B5EF4-FFF2-40B4-BE49-F238E27FC236}">
                 <a16:creationId xmlns:a16="http://schemas.microsoft.com/office/drawing/2014/main" id="{6A0BE762-E5B9-CAFA-9E55-F32EEA792A26}"/>
@@ -367,7 +367,7 @@
       </p:grpSpPr>
       <p:sp>
         <p:nvSpPr>
-          <p:cNvPr id="2" name="title_top_1">
+          <p:cNvPr id="2" name="title_top">
             <a:extLst>
               <a:ext uri="{FF2B5EF4-FFF2-40B4-BE49-F238E27FC236}">
                 <a16:creationId xmlns:a16="http://schemas.microsoft.com/office/drawing/2014/main" id="{9DF92BB2-90A0-1A3E-F4E8-D3E2E3107435}"/>
@@ -395,7 +395,7 @@
       </p:sp>
       <p:sp>
         <p:nvSpPr>
-          <p:cNvPr id="3" name="content_1">
+          <p:cNvPr id="3" name="content">
             <a:extLst>
               <a:ext uri="{FF2B5EF4-FFF2-40B4-BE49-F238E27FC236}">
                 <a16:creationId xmlns:a16="http://schemas.microsoft.com/office/drawing/2014/main" id="{0221042B-15B3-A933-BBDD-D8C661BB6417}"/>
@@ -452,7 +452,7 @@
       </p:sp>
       <p:sp>
         <p:nvSpPr>
-          <p:cNvPr id="4" name="date_footer_1">
+          <p:cNvPr id="4" name="date_footer">
             <a:extLst>
               <a:ext uri="{FF2B5EF4-FFF2-40B4-BE49-F238E27FC236}">
                 <a16:creationId xmlns:a16="http://schemas.microsoft.com/office/drawing/2014/main" id="{E88C8734-F937-9769-F315-D3DA12C508E8}"/>
@@ -473,7 +473,7 @@
           <a:p>
             <a:fld id="{EC529286-92C0-9541-AD8C-01D6C4AD1D19}" type="datetimeFigureOut">
               <a:rPr lang="en-US" smtClean="0"/>
-              <a:t>6/22/25</a:t>
+              <a:t>7/7/25</a:t>
             </a:fld>
             <a:endParaRPr lang="en-US"/>
           </a:p>
@@ -481,7 +481,7 @@
       </p:sp>
       <p:sp>
         <p:nvSpPr>
-          <p:cNvPr id="5" name="footer_footer_1">
+          <p:cNvPr id="5" name="footer_footer">
             <a:extLst>
               <a:ext uri="{FF2B5EF4-FFF2-40B4-BE49-F238E27FC236}">
                 <a16:creationId xmlns:a16="http://schemas.microsoft.com/office/drawing/2014/main" id="{BC7880A5-BD1A-FCB5-0B24-646DADD02B36}"/>
@@ -506,7 +506,7 @@
       </p:sp>
       <p:sp>
         <p:nvSpPr>
-          <p:cNvPr id="6" name="slide_number_footer_1">
+          <p:cNvPr id="6" name="slide_number_footer">
             <a:extLst>
               <a:ext uri="{FF2B5EF4-FFF2-40B4-BE49-F238E27FC236}">
                 <a16:creationId xmlns:a16="http://schemas.microsoft.com/office/drawing/2014/main" id="{99AF9F98-B4EA-4BB4-C40E-99D2388125A5}"/>
@@ -565,7 +565,7 @@
       </p:grpSpPr>
       <p:sp>
         <p:nvSpPr>
-          <p:cNvPr id="2" name="title_top_1">
+          <p:cNvPr id="2" name="title_top">
             <a:extLst>
               <a:ext uri="{FF2B5EF4-FFF2-40B4-BE49-F238E27FC236}">
                 <a16:creationId xmlns:a16="http://schemas.microsoft.com/office/drawing/2014/main" id="{649F9082-7301-2126-CFB8-D1C7E9551F34}"/>
@@ -598,7 +598,7 @@
       </p:sp>
       <p:sp>
         <p:nvSpPr>
-          <p:cNvPr id="3" name="content_1">
+          <p:cNvPr id="3" name="content">
             <a:extLst>
               <a:ext uri="{FF2B5EF4-FFF2-40B4-BE49-F238E27FC236}">
                 <a16:creationId xmlns:a16="http://schemas.microsoft.com/office/drawing/2014/main" id="{8F4FB9DE-2E90-FF48-B12F-E0CD014BFD9F}"/>
@@ -660,7 +660,7 @@
       </p:sp>
       <p:sp>
         <p:nvSpPr>
-          <p:cNvPr id="4" name="date_footer_1">
+          <p:cNvPr id="4" name="date_footer">
             <a:extLst>
               <a:ext uri="{FF2B5EF4-FFF2-40B4-BE49-F238E27FC236}">
                 <a16:creationId xmlns:a16="http://schemas.microsoft.com/office/drawing/2014/main" id="{89DB3773-94E4-C353-BCA3-64EC3587056D}"/>
@@ -681,7 +681,7 @@
           <a:p>
             <a:fld id="{EC529286-92C0-9541-AD8C-01D6C4AD1D19}" type="datetimeFigureOut">
               <a:rPr lang="en-US" smtClean="0"/>
-              <a:t>6/22/25</a:t>
+              <a:t>7/7/25</a:t>
             </a:fld>
             <a:endParaRPr lang="en-US"/>
           </a:p>
@@ -689,7 +689,7 @@
       </p:sp>
       <p:sp>
         <p:nvSpPr>
-          <p:cNvPr id="5" name="footer_footer_1">
+          <p:cNvPr id="5" name="footer_footer">
             <a:extLst>
               <a:ext uri="{FF2B5EF4-FFF2-40B4-BE49-F238E27FC236}">
                 <a16:creationId xmlns:a16="http://schemas.microsoft.com/office/drawing/2014/main" id="{961B8EB8-F9E3-AFCA-4125-47A59660CC35}"/>
@@ -714,7 +714,7 @@
       </p:sp>
       <p:sp>
         <p:nvSpPr>
-          <p:cNvPr id="6" name="slide_number_footer_1">
+          <p:cNvPr id="6" name="slide_number_footer">
             <a:extLst>
               <a:ext uri="{FF2B5EF4-FFF2-40B4-BE49-F238E27FC236}">
                 <a16:creationId xmlns:a16="http://schemas.microsoft.com/office/drawing/2014/main" id="{40EEFED1-1702-3FE1-FF04-FC05CBEBA5E0}"/>
@@ -773,7 +773,7 @@
       </p:grpSpPr>
       <p:sp>
         <p:nvSpPr>
-          <p:cNvPr id="2" name="title_top_1">
+          <p:cNvPr id="2" name="title_top">
             <a:extLst>
               <a:ext uri="{FF2B5EF4-FFF2-40B4-BE49-F238E27FC236}">
                 <a16:creationId xmlns:a16="http://schemas.microsoft.com/office/drawing/2014/main" id="{2EE8977F-7A7D-ED41-7370-2E2BFBEDFFBB}"/>
@@ -801,7 +801,7 @@
       </p:sp>
       <p:sp>
         <p:nvSpPr>
-          <p:cNvPr id="15" name="title_col1_1">
+          <p:cNvPr id="15" name="title_col1">
             <a:extLst>
               <a:ext uri="{FF2B5EF4-FFF2-40B4-BE49-F238E27FC236}">
                 <a16:creationId xmlns:a16="http://schemas.microsoft.com/office/drawing/2014/main" id="{C5582F3A-D943-D22B-50C2-39C5D4F802ED}"/>
@@ -839,7 +839,7 @@
       </p:sp>
       <p:sp>
         <p:nvSpPr>
-          <p:cNvPr id="16" name="content_col1_1">
+          <p:cNvPr id="16" name="content_col1">
             <a:extLst>
               <a:ext uri="{FF2B5EF4-FFF2-40B4-BE49-F238E27FC236}">
                 <a16:creationId xmlns:a16="http://schemas.microsoft.com/office/drawing/2014/main" id="{9A8DBF07-BA14-1071-232B-F98DD4E14219}"/>
@@ -877,7 +877,7 @@
       </p:sp>
       <p:sp>
         <p:nvSpPr>
-          <p:cNvPr id="17" name="title_col2_1">
+          <p:cNvPr id="17" name="title_col2">
             <a:extLst>
               <a:ext uri="{FF2B5EF4-FFF2-40B4-BE49-F238E27FC236}">
                 <a16:creationId xmlns:a16="http://schemas.microsoft.com/office/drawing/2014/main" id="{C68EEECF-A9A2-01FF-29D1-8860960C11F2}"/>
@@ -915,7 +915,7 @@
       </p:sp>
       <p:sp>
         <p:nvSpPr>
-          <p:cNvPr id="18" name="content_col2_1">
+          <p:cNvPr id="18" name="content_col2">
             <a:extLst>
               <a:ext uri="{FF2B5EF4-FFF2-40B4-BE49-F238E27FC236}">
                 <a16:creationId xmlns:a16="http://schemas.microsoft.com/office/drawing/2014/main" id="{3243E739-7F7F-7D90-BE91-2AD0ED2AACF7}"/>
@@ -953,7 +953,7 @@
       </p:sp>
       <p:sp>
         <p:nvSpPr>
-          <p:cNvPr id="19" name="title_col3_1">
+          <p:cNvPr id="19" name="title_col3">
             <a:extLst>
               <a:ext uri="{FF2B5EF4-FFF2-40B4-BE49-F238E27FC236}">
                 <a16:creationId xmlns:a16="http://schemas.microsoft.com/office/drawing/2014/main" id="{D573766F-5004-93C6-42A6-7E3631D73094}"/>
@@ -991,7 +991,7 @@
       </p:sp>
       <p:sp>
         <p:nvSpPr>
-          <p:cNvPr id="20" name="content_col3_1">
+          <p:cNvPr id="20" name="content_col3">
             <a:extLst>
               <a:ext uri="{FF2B5EF4-FFF2-40B4-BE49-F238E27FC236}">
                 <a16:creationId xmlns:a16="http://schemas.microsoft.com/office/drawing/2014/main" id="{46D4B212-27B2-3CDE-4333-250AB6ED6943}"/>
@@ -1029,7 +1029,7 @@
       </p:sp>
       <p:sp>
         <p:nvSpPr>
-          <p:cNvPr id="3" name="date_footer_1">
+          <p:cNvPr id="3" name="date_footer">
             <a:extLst>
               <a:ext uri="{FF2B5EF4-FFF2-40B4-BE49-F238E27FC236}">
                 <a16:creationId xmlns:a16="http://schemas.microsoft.com/office/drawing/2014/main" id="{0C5DD35D-1952-C99B-E166-7B080AC7AFB5}"/>
@@ -1050,7 +1050,7 @@
           <a:p>
             <a:fld id="{EC529286-92C0-9541-AD8C-01D6C4AD1D19}" type="datetimeFigureOut">
               <a:rPr lang="en-AU" smtClean="0"/>
-              <a:t>22/6/2025</a:t>
+              <a:t>7/7/2025</a:t>
             </a:fld>
             <a:endParaRPr lang="en-AU" dirty="0"/>
           </a:p>
@@ -1058,7 +1058,7 @@
       </p:sp>
       <p:sp>
         <p:nvSpPr>
-          <p:cNvPr id="4" name="footer_footer_1">
+          <p:cNvPr id="4" name="footer_footer">
             <a:extLst>
               <a:ext uri="{FF2B5EF4-FFF2-40B4-BE49-F238E27FC236}">
                 <a16:creationId xmlns:a16="http://schemas.microsoft.com/office/drawing/2014/main" id="{06FE9D83-1B1B-0E92-559C-E83F0EE298A4}"/>
@@ -1083,7 +1083,7 @@
       </p:sp>
       <p:sp>
         <p:nvSpPr>
-          <p:cNvPr id="5" name="slide_number_footer_1">
+          <p:cNvPr id="5" name="slide_number_footer">
             <a:extLst>
               <a:ext uri="{FF2B5EF4-FFF2-40B4-BE49-F238E27FC236}">
                 <a16:creationId xmlns:a16="http://schemas.microsoft.com/office/drawing/2014/main" id="{FA093232-03CE-D3D4-9EED-ECB2BD712A7E}"/>
@@ -1158,7 +1158,7 @@
       </p:grpSpPr>
       <p:sp>
         <p:nvSpPr>
-          <p:cNvPr id="2" name="title_top_1">
+          <p:cNvPr id="2" name="title_top">
             <a:extLst>
               <a:ext uri="{FF2B5EF4-FFF2-40B4-BE49-F238E27FC236}">
                 <a16:creationId xmlns:a16="http://schemas.microsoft.com/office/drawing/2014/main" id="{2EE8977F-7A7D-ED41-7370-2E2BFBEDFFBB}"/>
@@ -1186,7 +1186,7 @@
       </p:sp>
       <p:sp>
         <p:nvSpPr>
-          <p:cNvPr id="16" name="content_col1_1">
+          <p:cNvPr id="16" name="content_col1">
             <a:extLst>
               <a:ext uri="{FF2B5EF4-FFF2-40B4-BE49-F238E27FC236}">
                 <a16:creationId xmlns:a16="http://schemas.microsoft.com/office/drawing/2014/main" id="{9A8DBF07-BA14-1071-232B-F98DD4E14219}"/>
@@ -1224,7 +1224,7 @@
       </p:sp>
       <p:sp>
         <p:nvSpPr>
-          <p:cNvPr id="18" name="content_col2_1">
+          <p:cNvPr id="18" name="content_col2">
             <a:extLst>
               <a:ext uri="{FF2B5EF4-FFF2-40B4-BE49-F238E27FC236}">
                 <a16:creationId xmlns:a16="http://schemas.microsoft.com/office/drawing/2014/main" id="{3243E739-7F7F-7D90-BE91-2AD0ED2AACF7}"/>
@@ -1262,7 +1262,7 @@
       </p:sp>
       <p:sp>
         <p:nvSpPr>
-          <p:cNvPr id="20" name="content_col3_1">
+          <p:cNvPr id="20" name="content_col3">
             <a:extLst>
               <a:ext uri="{FF2B5EF4-FFF2-40B4-BE49-F238E27FC236}">
                 <a16:creationId xmlns:a16="http://schemas.microsoft.com/office/drawing/2014/main" id="{46D4B212-27B2-3CDE-4333-250AB6ED6943}"/>
@@ -1300,7 +1300,7 @@
       </p:sp>
       <p:sp>
         <p:nvSpPr>
-          <p:cNvPr id="3" name="date_footer_1">
+          <p:cNvPr id="3" name="date_footer">
             <a:extLst>
               <a:ext uri="{FF2B5EF4-FFF2-40B4-BE49-F238E27FC236}">
                 <a16:creationId xmlns:a16="http://schemas.microsoft.com/office/drawing/2014/main" id="{0C5DD35D-1952-C99B-E166-7B080AC7AFB5}"/>
@@ -1321,7 +1321,7 @@
           <a:p>
             <a:fld id="{EC529286-92C0-9541-AD8C-01D6C4AD1D19}" type="datetimeFigureOut">
               <a:rPr lang="en-AU" smtClean="0"/>
-              <a:t>22/6/2025</a:t>
+              <a:t>7/7/2025</a:t>
             </a:fld>
             <a:endParaRPr lang="en-AU" dirty="0"/>
           </a:p>
@@ -1329,7 +1329,7 @@
       </p:sp>
       <p:sp>
         <p:nvSpPr>
-          <p:cNvPr id="4" name="footer_footer_1">
+          <p:cNvPr id="4" name="footer_footer">
             <a:extLst>
               <a:ext uri="{FF2B5EF4-FFF2-40B4-BE49-F238E27FC236}">
                 <a16:creationId xmlns:a16="http://schemas.microsoft.com/office/drawing/2014/main" id="{06FE9D83-1B1B-0E92-559C-E83F0EE298A4}"/>
@@ -1354,7 +1354,7 @@
       </p:sp>
       <p:sp>
         <p:nvSpPr>
-          <p:cNvPr id="5" name="slide_number_footer_1">
+          <p:cNvPr id="5" name="slide_number_footer">
             <a:extLst>
               <a:ext uri="{FF2B5EF4-FFF2-40B4-BE49-F238E27FC236}">
                 <a16:creationId xmlns:a16="http://schemas.microsoft.com/office/drawing/2014/main" id="{FA093232-03CE-D3D4-9EED-ECB2BD712A7E}"/>
@@ -1429,7 +1429,7 @@
       </p:grpSpPr>
       <p:sp>
         <p:nvSpPr>
-          <p:cNvPr id="2" name="title_top_1">
+          <p:cNvPr id="2" name="title_top">
             <a:extLst>
               <a:ext uri="{FF2B5EF4-FFF2-40B4-BE49-F238E27FC236}">
                 <a16:creationId xmlns:a16="http://schemas.microsoft.com/office/drawing/2014/main" id="{2EE8977F-7A7D-ED41-7370-2E2BFBEDFFBB}"/>
@@ -1457,7 +1457,7 @@
       </p:sp>
       <p:sp>
         <p:nvSpPr>
-          <p:cNvPr id="15" name="title_col1_1">
+          <p:cNvPr id="15" name="title_col1">
             <a:extLst>
               <a:ext uri="{FF2B5EF4-FFF2-40B4-BE49-F238E27FC236}">
                 <a16:creationId xmlns:a16="http://schemas.microsoft.com/office/drawing/2014/main" id="{C5582F3A-D943-D22B-50C2-39C5D4F802ED}"/>
@@ -1495,7 +1495,7 @@
       </p:sp>
       <p:sp>
         <p:nvSpPr>
-          <p:cNvPr id="16" name="content_col1_1">
+          <p:cNvPr id="16" name="content_col1">
             <a:extLst>
               <a:ext uri="{FF2B5EF4-FFF2-40B4-BE49-F238E27FC236}">
                 <a16:creationId xmlns:a16="http://schemas.microsoft.com/office/drawing/2014/main" id="{9A8DBF07-BA14-1071-232B-F98DD4E14219}"/>
@@ -1533,7 +1533,7 @@
       </p:sp>
       <p:sp>
         <p:nvSpPr>
-          <p:cNvPr id="17" name="title_col2_1">
+          <p:cNvPr id="17" name="title_col2">
             <a:extLst>
               <a:ext uri="{FF2B5EF4-FFF2-40B4-BE49-F238E27FC236}">
                 <a16:creationId xmlns:a16="http://schemas.microsoft.com/office/drawing/2014/main" id="{C68EEECF-A9A2-01FF-29D1-8860960C11F2}"/>
@@ -1571,7 +1571,7 @@
       </p:sp>
       <p:sp>
         <p:nvSpPr>
-          <p:cNvPr id="18" name="content_col2_1">
+          <p:cNvPr id="18" name="content_col2">
             <a:extLst>
               <a:ext uri="{FF2B5EF4-FFF2-40B4-BE49-F238E27FC236}">
                 <a16:creationId xmlns:a16="http://schemas.microsoft.com/office/drawing/2014/main" id="{3243E739-7F7F-7D90-BE91-2AD0ED2AACF7}"/>
@@ -1609,7 +1609,7 @@
       </p:sp>
       <p:sp>
         <p:nvSpPr>
-          <p:cNvPr id="19" name="title_col3_1">
+          <p:cNvPr id="19" name="title_col3">
             <a:extLst>
               <a:ext uri="{FF2B5EF4-FFF2-40B4-BE49-F238E27FC236}">
                 <a16:creationId xmlns:a16="http://schemas.microsoft.com/office/drawing/2014/main" id="{D573766F-5004-93C6-42A6-7E3631D73094}"/>
@@ -1647,7 +1647,7 @@
       </p:sp>
       <p:sp>
         <p:nvSpPr>
-          <p:cNvPr id="20" name="content_col3_1">
+          <p:cNvPr id="20" name="content_col3">
             <a:extLst>
               <a:ext uri="{FF2B5EF4-FFF2-40B4-BE49-F238E27FC236}">
                 <a16:creationId xmlns:a16="http://schemas.microsoft.com/office/drawing/2014/main" id="{46D4B212-27B2-3CDE-4333-250AB6ED6943}"/>
@@ -1685,7 +1685,7 @@
       </p:sp>
       <p:sp>
         <p:nvSpPr>
-          <p:cNvPr id="21" name="title_col4_1">
+          <p:cNvPr id="21" name="title_col4">
             <a:extLst>
               <a:ext uri="{FF2B5EF4-FFF2-40B4-BE49-F238E27FC236}">
                 <a16:creationId xmlns:a16="http://schemas.microsoft.com/office/drawing/2014/main" id="{F12D07A2-F21E-7459-600E-C4B7BD11CD64}"/>
@@ -1723,7 +1723,7 @@
       </p:sp>
       <p:sp>
         <p:nvSpPr>
-          <p:cNvPr id="22" name="content_col4_1">
+          <p:cNvPr id="22" name="content_col4">
             <a:extLst>
               <a:ext uri="{FF2B5EF4-FFF2-40B4-BE49-F238E27FC236}">
                 <a16:creationId xmlns:a16="http://schemas.microsoft.com/office/drawing/2014/main" id="{C35A8091-5AA2-245D-989D-83E80FA1E6B3}"/>
@@ -1761,7 +1761,7 @@
       </p:sp>
       <p:sp>
         <p:nvSpPr>
-          <p:cNvPr id="3" name="date_footer_1">
+          <p:cNvPr id="3" name="date_footer">
             <a:extLst>
               <a:ext uri="{FF2B5EF4-FFF2-40B4-BE49-F238E27FC236}">
                 <a16:creationId xmlns:a16="http://schemas.microsoft.com/office/drawing/2014/main" id="{0C5DD35D-1952-C99B-E166-7B080AC7AFB5}"/>
@@ -1782,7 +1782,7 @@
           <a:p>
             <a:fld id="{EC529286-92C0-9541-AD8C-01D6C4AD1D19}" type="datetimeFigureOut">
               <a:rPr lang="en-AU" smtClean="0"/>
-              <a:t>22/6/2025</a:t>
+              <a:t>7/7/2025</a:t>
             </a:fld>
             <a:endParaRPr lang="en-AU" dirty="0"/>
           </a:p>
@@ -1790,7 +1790,7 @@
       </p:sp>
       <p:sp>
         <p:nvSpPr>
-          <p:cNvPr id="4" name="footer_footer_1">
+          <p:cNvPr id="4" name="footer_footer">
             <a:extLst>
               <a:ext uri="{FF2B5EF4-FFF2-40B4-BE49-F238E27FC236}">
                 <a16:creationId xmlns:a16="http://schemas.microsoft.com/office/drawing/2014/main" id="{06FE9D83-1B1B-0E92-559C-E83F0EE298A4}"/>
@@ -1815,7 +1815,7 @@
       </p:sp>
       <p:sp>
         <p:nvSpPr>
-          <p:cNvPr id="5" name="slide_number_footer_1">
+          <p:cNvPr id="5" name="slide_number_footer">
             <a:extLst>
               <a:ext uri="{FF2B5EF4-FFF2-40B4-BE49-F238E27FC236}">
                 <a16:creationId xmlns:a16="http://schemas.microsoft.com/office/drawing/2014/main" id="{FA093232-03CE-D3D4-9EED-ECB2BD712A7E}"/>
@@ -1874,7 +1874,7 @@
       </p:grpSpPr>
       <p:sp>
         <p:nvSpPr>
-          <p:cNvPr id="2" name="title_top_1">
+          <p:cNvPr id="2" name="title_top">
             <a:extLst>
               <a:ext uri="{FF2B5EF4-FFF2-40B4-BE49-F238E27FC236}">
                 <a16:creationId xmlns:a16="http://schemas.microsoft.com/office/drawing/2014/main" id="{2EE8977F-7A7D-ED41-7370-2E2BFBEDFFBB}"/>
@@ -1902,7 +1902,7 @@
       </p:sp>
       <p:sp>
         <p:nvSpPr>
-          <p:cNvPr id="16" name="content_col1_1">
+          <p:cNvPr id="16" name="content_col1">
             <a:extLst>
               <a:ext uri="{FF2B5EF4-FFF2-40B4-BE49-F238E27FC236}">
                 <a16:creationId xmlns:a16="http://schemas.microsoft.com/office/drawing/2014/main" id="{9A8DBF07-BA14-1071-232B-F98DD4E14219}"/>
@@ -1940,7 +1940,7 @@
       </p:sp>
       <p:sp>
         <p:nvSpPr>
-          <p:cNvPr id="18" name="content_col2_1">
+          <p:cNvPr id="18" name="content_col2">
             <a:extLst>
               <a:ext uri="{FF2B5EF4-FFF2-40B4-BE49-F238E27FC236}">
                 <a16:creationId xmlns:a16="http://schemas.microsoft.com/office/drawing/2014/main" id="{3243E739-7F7F-7D90-BE91-2AD0ED2AACF7}"/>
@@ -1978,7 +1978,7 @@
       </p:sp>
       <p:sp>
         <p:nvSpPr>
-          <p:cNvPr id="20" name="content_col3_1">
+          <p:cNvPr id="20" name="content_col3">
             <a:extLst>
               <a:ext uri="{FF2B5EF4-FFF2-40B4-BE49-F238E27FC236}">
                 <a16:creationId xmlns:a16="http://schemas.microsoft.com/office/drawing/2014/main" id="{46D4B212-27B2-3CDE-4333-250AB6ED6943}"/>
@@ -2016,7 +2016,7 @@
       </p:sp>
       <p:sp>
         <p:nvSpPr>
-          <p:cNvPr id="22" name="content_col4_1">
+          <p:cNvPr id="22" name="content_col4">
             <a:extLst>
               <a:ext uri="{FF2B5EF4-FFF2-40B4-BE49-F238E27FC236}">
                 <a16:creationId xmlns:a16="http://schemas.microsoft.com/office/drawing/2014/main" id="{C35A8091-5AA2-245D-989D-83E80FA1E6B3}"/>
@@ -2054,7 +2054,7 @@
       </p:sp>
       <p:sp>
         <p:nvSpPr>
-          <p:cNvPr id="3" name="date_footer_1">
+          <p:cNvPr id="3" name="date_footer">
             <a:extLst>
               <a:ext uri="{FF2B5EF4-FFF2-40B4-BE49-F238E27FC236}">
                 <a16:creationId xmlns:a16="http://schemas.microsoft.com/office/drawing/2014/main" id="{0C5DD35D-1952-C99B-E166-7B080AC7AFB5}"/>
@@ -2075,7 +2075,7 @@
           <a:p>
             <a:fld id="{EC529286-92C0-9541-AD8C-01D6C4AD1D19}" type="datetimeFigureOut">
               <a:rPr lang="en-AU" smtClean="0"/>
-              <a:t>22/6/2025</a:t>
+              <a:t>7/7/2025</a:t>
             </a:fld>
             <a:endParaRPr lang="en-AU" dirty="0"/>
           </a:p>
@@ -2083,7 +2083,7 @@
       </p:sp>
       <p:sp>
         <p:nvSpPr>
-          <p:cNvPr id="4" name="footer_footer_1">
+          <p:cNvPr id="4" name="footer_footer">
             <a:extLst>
               <a:ext uri="{FF2B5EF4-FFF2-40B4-BE49-F238E27FC236}">
                 <a16:creationId xmlns:a16="http://schemas.microsoft.com/office/drawing/2014/main" id="{06FE9D83-1B1B-0E92-559C-E83F0EE298A4}"/>
@@ -2108,7 +2108,7 @@
       </p:sp>
       <p:sp>
         <p:nvSpPr>
-          <p:cNvPr id="5" name="slide_number_footer_1">
+          <p:cNvPr id="5" name="slide_number_footer">
             <a:extLst>
               <a:ext uri="{FF2B5EF4-FFF2-40B4-BE49-F238E27FC236}">
                 <a16:creationId xmlns:a16="http://schemas.microsoft.com/office/drawing/2014/main" id="{FA093232-03CE-D3D4-9EED-ECB2BD712A7E}"/>
@@ -2295,13 +2295,16 @@
           </a:lstStyle>
           <a:p>
             <a:pPr algn="ctr"/>
-            <a:endParaRPr lang="en-US" altLang="zh-CN" b="1" noProof="1">
-              <a:solidFill>
-                <a:schemeClr val="bg2"/>
-              </a:solidFill>
-              <a:latin typeface="+mj-lt"/>
-              <a:ea typeface="+mj-ea"/>
-            </a:endParaRPr>
+            <a:r>
+              <a:rPr lang="en-US" altLang="zh-CN" b="1" noProof="1">
+                <a:solidFill>
+                  <a:schemeClr val="bg2"/>
+                </a:solidFill>
+                <a:latin typeface="+mj-lt"/>
+                <a:ea typeface="+mj-ea"/>
+              </a:rPr>
+              <a:t>01</a:t>
+            </a:r>
           </a:p>
         </p:txBody>
       </p:sp>
@@ -2435,13 +2438,16 @@
           </a:lstStyle>
           <a:p>
             <a:pPr algn="ctr"/>
-            <a:endParaRPr lang="en-US" altLang="zh-CN" b="1" noProof="1">
-              <a:solidFill>
-                <a:schemeClr val="bg2"/>
-              </a:solidFill>
-              <a:latin typeface="+mj-lt"/>
-              <a:ea typeface="+mj-ea"/>
-            </a:endParaRPr>
+            <a:r>
+              <a:rPr lang="en-US" altLang="zh-CN" b="1" noProof="1">
+                <a:solidFill>
+                  <a:schemeClr val="bg2"/>
+                </a:solidFill>
+                <a:latin typeface="+mj-lt"/>
+                <a:ea typeface="+mj-ea"/>
+              </a:rPr>
+              <a:t>02</a:t>
+            </a:r>
           </a:p>
         </p:txBody>
       </p:sp>
@@ -2575,13 +2581,16 @@
           </a:lstStyle>
           <a:p>
             <a:pPr algn="ctr"/>
-            <a:endParaRPr lang="en-US" altLang="zh-CN" b="1" noProof="1">
-              <a:solidFill>
-                <a:schemeClr val="bg2"/>
-              </a:solidFill>
-              <a:latin typeface="+mj-lt"/>
-              <a:ea typeface="+mj-ea"/>
-            </a:endParaRPr>
+            <a:r>
+              <a:rPr lang="en-US" altLang="zh-CN" b="1" noProof="1">
+                <a:solidFill>
+                  <a:schemeClr val="bg2"/>
+                </a:solidFill>
+                <a:latin typeface="+mj-lt"/>
+                <a:ea typeface="+mj-ea"/>
+              </a:rPr>
+              <a:t>03</a:t>
+            </a:r>
           </a:p>
         </p:txBody>
       </p:sp>
@@ -2715,13 +2724,16 @@
           </a:lstStyle>
           <a:p>
             <a:pPr algn="ctr"/>
-            <a:endParaRPr lang="en-US" altLang="zh-CN" b="1" noProof="1">
-              <a:solidFill>
-                <a:schemeClr val="bg2"/>
-              </a:solidFill>
-              <a:latin typeface="+mj-lt"/>
-              <a:ea typeface="+mj-ea"/>
-            </a:endParaRPr>
+            <a:r>
+              <a:rPr lang="en-US" altLang="zh-CN" b="1" noProof="1">
+                <a:solidFill>
+                  <a:schemeClr val="bg2"/>
+                </a:solidFill>
+                <a:latin typeface="+mj-lt"/>
+                <a:ea typeface="+mj-ea"/>
+              </a:rPr>
+              <a:t>04</a:t>
+            </a:r>
           </a:p>
         </p:txBody>
       </p:sp>
@@ -2855,13 +2867,16 @@
           </a:lstStyle>
           <a:p>
             <a:pPr algn="ctr"/>
-            <a:endParaRPr lang="en-US" altLang="zh-CN" b="1" noProof="1">
-              <a:solidFill>
-                <a:schemeClr val="bg2"/>
-              </a:solidFill>
-              <a:latin typeface="+mj-lt"/>
-              <a:ea typeface="+mj-ea"/>
-            </a:endParaRPr>
+            <a:r>
+              <a:rPr lang="en-US" altLang="zh-CN" b="1" noProof="1">
+                <a:solidFill>
+                  <a:schemeClr val="bg2"/>
+                </a:solidFill>
+                <a:latin typeface="+mj-lt"/>
+                <a:ea typeface="+mj-ea"/>
+              </a:rPr>
+              <a:t>05</a:t>
+            </a:r>
           </a:p>
         </p:txBody>
       </p:sp>
@@ -2995,19 +3010,22 @@
           </a:lstStyle>
           <a:p>
             <a:pPr algn="ctr"/>
-            <a:endParaRPr lang="en-US" altLang="zh-CN" b="1" noProof="1">
-              <a:solidFill>
-                <a:schemeClr val="bg2"/>
-              </a:solidFill>
-              <a:latin typeface="+mj-lt"/>
-              <a:ea typeface="+mj-ea"/>
-            </a:endParaRPr>
-          </a:p>
-        </p:txBody>
-      </p:sp>
-      <p:sp>
-        <p:nvSpPr>
-          <p:cNvPr id="2" name="title_top_1">
+            <a:r>
+              <a:rPr lang="en-US" altLang="zh-CN" b="1" noProof="1">
+                <a:solidFill>
+                  <a:schemeClr val="bg2"/>
+                </a:solidFill>
+                <a:latin typeface="+mj-lt"/>
+                <a:ea typeface="+mj-ea"/>
+              </a:rPr>
+              <a:t>06</a:t>
+            </a:r>
+          </a:p>
+        </p:txBody>
+      </p:sp>
+      <p:sp>
+        <p:nvSpPr>
+          <p:cNvPr id="2" name="title_top">
             <a:extLst>
               <a:ext uri="{FF2B5EF4-FFF2-40B4-BE49-F238E27FC236}">
                 <a16:creationId xmlns:a16="http://schemas.microsoft.com/office/drawing/2014/main" id="{4E4019F8-742E-9EEF-F591-C9666AC32AF1}"/>
@@ -3050,71 +3068,7 @@
       </p:sp>
       <p:sp>
         <p:nvSpPr>
-          <p:cNvPr id="4" name="number_item1_1">
-            <a:extLst>
-              <a:ext uri="{FF2B5EF4-FFF2-40B4-BE49-F238E27FC236}">
-                <a16:creationId xmlns:a16="http://schemas.microsoft.com/office/drawing/2014/main" id="{7922A121-F74E-1DBB-F90E-9ECA5D27387F}"/>
-              </a:ext>
-            </a:extLst>
-          </p:cNvPr>
-          <p:cNvSpPr>
-            <a:spLocks noGrp="1"/>
-          </p:cNvSpPr>
-          <p:nvPr>
-            <p:ph type="body" sz="quarter" idx="28" hasCustomPrompt="1"/>
-          </p:nvPr>
-        </p:nvSpPr>
-        <p:spPr>
-          <a:xfrm>
-            <a:off x="964941" y="2587692"/>
-            <a:ext cx="511674" cy="444763"/>
-          </a:xfrm>
-        </p:spPr>
-        <p:txBody>
-          <a:bodyPr anchor="ctr"/>
-          <a:lstStyle>
-            <a:lvl1pPr marL="0" indent="0" algn="ctr">
-              <a:buNone/>
-              <a:defRPr sz="1800" b="1">
-                <a:solidFill>
-                  <a:schemeClr val="bg2"/>
-                </a:solidFill>
-                <a:latin typeface="+mj-lt"/>
-              </a:defRPr>
-            </a:lvl1pPr>
-            <a:lvl2pPr>
-              <a:defRPr sz="1800">
-                <a:latin typeface="+mj-lt"/>
-              </a:defRPr>
-            </a:lvl2pPr>
-            <a:lvl3pPr>
-              <a:defRPr sz="1800">
-                <a:latin typeface="+mj-lt"/>
-              </a:defRPr>
-            </a:lvl3pPr>
-            <a:lvl4pPr>
-              <a:defRPr sz="1800">
-                <a:latin typeface="+mj-lt"/>
-              </a:defRPr>
-            </a:lvl4pPr>
-            <a:lvl5pPr>
-              <a:defRPr sz="1800">
-                <a:latin typeface="+mj-lt"/>
-              </a:defRPr>
-            </a:lvl5pPr>
-          </a:lstStyle>
-          <a:p>
-            <a:pPr lvl="0"/>
-            <a:r>
-              <a:rPr lang="en-US"/>
-              <a:t>01</a:t>
-            </a:r>
-          </a:p>
-        </p:txBody>
-      </p:sp>
-      <p:sp>
-        <p:nvSpPr>
-          <p:cNvPr id="9" name="content_item1_1">
+          <p:cNvPr id="9" name="content_item1">
             <a:extLst>
               <a:ext uri="{FF2B5EF4-FFF2-40B4-BE49-F238E27FC236}">
                 <a16:creationId xmlns:a16="http://schemas.microsoft.com/office/drawing/2014/main" id="{41A28972-BB4A-9DE5-EC1C-17EC2CEC12C1}"/>
@@ -3183,71 +3137,7 @@
       </p:sp>
       <p:sp>
         <p:nvSpPr>
-          <p:cNvPr id="5" name="number_item2_1">
-            <a:extLst>
-              <a:ext uri="{FF2B5EF4-FFF2-40B4-BE49-F238E27FC236}">
-                <a16:creationId xmlns:a16="http://schemas.microsoft.com/office/drawing/2014/main" id="{A1934284-00BE-576C-F2BA-050CD34490BA}"/>
-              </a:ext>
-            </a:extLst>
-          </p:cNvPr>
-          <p:cNvSpPr>
-            <a:spLocks noGrp="1"/>
-          </p:cNvSpPr>
-          <p:nvPr>
-            <p:ph type="body" sz="quarter" idx="29" hasCustomPrompt="1"/>
-          </p:nvPr>
-        </p:nvSpPr>
-        <p:spPr>
-          <a:xfrm>
-            <a:off x="964941" y="3736734"/>
-            <a:ext cx="511674" cy="444763"/>
-          </a:xfrm>
-        </p:spPr>
-        <p:txBody>
-          <a:bodyPr anchor="ctr"/>
-          <a:lstStyle>
-            <a:lvl1pPr marL="0" indent="0" algn="ctr">
-              <a:buNone/>
-              <a:defRPr sz="1800" b="1">
-                <a:solidFill>
-                  <a:schemeClr val="bg2"/>
-                </a:solidFill>
-                <a:latin typeface="+mj-lt"/>
-              </a:defRPr>
-            </a:lvl1pPr>
-            <a:lvl2pPr>
-              <a:defRPr sz="1800">
-                <a:latin typeface="+mj-lt"/>
-              </a:defRPr>
-            </a:lvl2pPr>
-            <a:lvl3pPr>
-              <a:defRPr sz="1800">
-                <a:latin typeface="+mj-lt"/>
-              </a:defRPr>
-            </a:lvl3pPr>
-            <a:lvl4pPr>
-              <a:defRPr sz="1800">
-                <a:latin typeface="+mj-lt"/>
-              </a:defRPr>
-            </a:lvl4pPr>
-            <a:lvl5pPr>
-              <a:defRPr sz="1800">
-                <a:latin typeface="+mj-lt"/>
-              </a:defRPr>
-            </a:lvl5pPr>
-          </a:lstStyle>
-          <a:p>
-            <a:pPr lvl="0"/>
-            <a:r>
-              <a:rPr lang="en-US"/>
-              <a:t>02</a:t>
-            </a:r>
-          </a:p>
-        </p:txBody>
-      </p:sp>
-      <p:sp>
-        <p:nvSpPr>
-          <p:cNvPr id="22" name="content_item2_1">
+          <p:cNvPr id="22" name="content_item2">
             <a:extLst>
               <a:ext uri="{FF2B5EF4-FFF2-40B4-BE49-F238E27FC236}">
                 <a16:creationId xmlns:a16="http://schemas.microsoft.com/office/drawing/2014/main" id="{2D4614F8-0641-9496-CFCF-28C79812257F}"/>
@@ -3324,71 +3214,7 @@
       </p:sp>
       <p:sp>
         <p:nvSpPr>
-          <p:cNvPr id="11" name="number_item3_1">
-            <a:extLst>
-              <a:ext uri="{FF2B5EF4-FFF2-40B4-BE49-F238E27FC236}">
-                <a16:creationId xmlns:a16="http://schemas.microsoft.com/office/drawing/2014/main" id="{104425C6-1E3A-2D07-F971-EA5DD926CB83}"/>
-              </a:ext>
-            </a:extLst>
-          </p:cNvPr>
-          <p:cNvSpPr>
-            <a:spLocks noGrp="1"/>
-          </p:cNvSpPr>
-          <p:nvPr>
-            <p:ph type="body" sz="quarter" idx="30" hasCustomPrompt="1"/>
-          </p:nvPr>
-        </p:nvSpPr>
-        <p:spPr>
-          <a:xfrm>
-            <a:off x="964941" y="4888713"/>
-            <a:ext cx="511674" cy="444763"/>
-          </a:xfrm>
-        </p:spPr>
-        <p:txBody>
-          <a:bodyPr anchor="ctr"/>
-          <a:lstStyle>
-            <a:lvl1pPr marL="0" indent="0" algn="ctr">
-              <a:buNone/>
-              <a:defRPr sz="1800" b="1">
-                <a:solidFill>
-                  <a:schemeClr val="bg2"/>
-                </a:solidFill>
-                <a:latin typeface="+mj-lt"/>
-              </a:defRPr>
-            </a:lvl1pPr>
-            <a:lvl2pPr>
-              <a:defRPr sz="1800">
-                <a:latin typeface="+mj-lt"/>
-              </a:defRPr>
-            </a:lvl2pPr>
-            <a:lvl3pPr>
-              <a:defRPr sz="1800">
-                <a:latin typeface="+mj-lt"/>
-              </a:defRPr>
-            </a:lvl3pPr>
-            <a:lvl4pPr>
-              <a:defRPr sz="1800">
-                <a:latin typeface="+mj-lt"/>
-              </a:defRPr>
-            </a:lvl4pPr>
-            <a:lvl5pPr>
-              <a:defRPr sz="1800">
-                <a:latin typeface="+mj-lt"/>
-              </a:defRPr>
-            </a:lvl5pPr>
-          </a:lstStyle>
-          <a:p>
-            <a:pPr lvl="0"/>
-            <a:r>
-              <a:rPr lang="en-US"/>
-              <a:t>03</a:t>
-            </a:r>
-          </a:p>
-        </p:txBody>
-      </p:sp>
-      <p:sp>
-        <p:nvSpPr>
-          <p:cNvPr id="24" name="content_item3_1">
+          <p:cNvPr id="24" name="content_item3">
             <a:extLst>
               <a:ext uri="{FF2B5EF4-FFF2-40B4-BE49-F238E27FC236}">
                 <a16:creationId xmlns:a16="http://schemas.microsoft.com/office/drawing/2014/main" id="{F10C586E-C370-0572-962A-51D7AD99CB16}"/>
@@ -3465,71 +3291,7 @@
       </p:sp>
       <p:sp>
         <p:nvSpPr>
-          <p:cNvPr id="12" name="number_item4_1">
-            <a:extLst>
-              <a:ext uri="{FF2B5EF4-FFF2-40B4-BE49-F238E27FC236}">
-                <a16:creationId xmlns:a16="http://schemas.microsoft.com/office/drawing/2014/main" id="{676BF66F-CB64-BBEF-FBC9-3B4A250FF543}"/>
-              </a:ext>
-            </a:extLst>
-          </p:cNvPr>
-          <p:cNvSpPr>
-            <a:spLocks noGrp="1"/>
-          </p:cNvSpPr>
-          <p:nvPr>
-            <p:ph type="body" sz="quarter" idx="31" hasCustomPrompt="1"/>
-          </p:nvPr>
-        </p:nvSpPr>
-        <p:spPr>
-          <a:xfrm>
-            <a:off x="6285543" y="2590187"/>
-            <a:ext cx="511674" cy="444763"/>
-          </a:xfrm>
-        </p:spPr>
-        <p:txBody>
-          <a:bodyPr anchor="ctr"/>
-          <a:lstStyle>
-            <a:lvl1pPr marL="0" indent="0" algn="ctr">
-              <a:buNone/>
-              <a:defRPr sz="1800" b="1">
-                <a:solidFill>
-                  <a:schemeClr val="bg2"/>
-                </a:solidFill>
-                <a:latin typeface="+mj-lt"/>
-              </a:defRPr>
-            </a:lvl1pPr>
-            <a:lvl2pPr>
-              <a:defRPr sz="1800">
-                <a:latin typeface="+mj-lt"/>
-              </a:defRPr>
-            </a:lvl2pPr>
-            <a:lvl3pPr>
-              <a:defRPr sz="1800">
-                <a:latin typeface="+mj-lt"/>
-              </a:defRPr>
-            </a:lvl3pPr>
-            <a:lvl4pPr>
-              <a:defRPr sz="1800">
-                <a:latin typeface="+mj-lt"/>
-              </a:defRPr>
-            </a:lvl4pPr>
-            <a:lvl5pPr>
-              <a:defRPr sz="1800">
-                <a:latin typeface="+mj-lt"/>
-              </a:defRPr>
-            </a:lvl5pPr>
-          </a:lstStyle>
-          <a:p>
-            <a:pPr lvl="0"/>
-            <a:r>
-              <a:rPr lang="en-US"/>
-              <a:t>04</a:t>
-            </a:r>
-          </a:p>
-        </p:txBody>
-      </p:sp>
-      <p:sp>
-        <p:nvSpPr>
-          <p:cNvPr id="10" name="content_item4_1">
+          <p:cNvPr id="10" name="content_item4">
             <a:extLst>
               <a:ext uri="{FF2B5EF4-FFF2-40B4-BE49-F238E27FC236}">
                 <a16:creationId xmlns:a16="http://schemas.microsoft.com/office/drawing/2014/main" id="{C15F872C-5958-E6E3-B049-C7D76BD6022C}"/>
@@ -3606,71 +3368,7 @@
       </p:sp>
       <p:sp>
         <p:nvSpPr>
-          <p:cNvPr id="13" name="number_item5_1">
-            <a:extLst>
-              <a:ext uri="{FF2B5EF4-FFF2-40B4-BE49-F238E27FC236}">
-                <a16:creationId xmlns:a16="http://schemas.microsoft.com/office/drawing/2014/main" id="{09563155-4732-CF95-38F9-9E62545CF208}"/>
-              </a:ext>
-            </a:extLst>
-          </p:cNvPr>
-          <p:cNvSpPr>
-            <a:spLocks noGrp="1"/>
-          </p:cNvSpPr>
-          <p:nvPr>
-            <p:ph type="body" sz="quarter" idx="32" hasCustomPrompt="1"/>
-          </p:nvPr>
-        </p:nvSpPr>
-        <p:spPr>
-          <a:xfrm>
-            <a:off x="6285543" y="3736734"/>
-            <a:ext cx="511674" cy="444763"/>
-          </a:xfrm>
-        </p:spPr>
-        <p:txBody>
-          <a:bodyPr anchor="ctr"/>
-          <a:lstStyle>
-            <a:lvl1pPr marL="0" indent="0" algn="ctr">
-              <a:buNone/>
-              <a:defRPr sz="1800" b="1">
-                <a:solidFill>
-                  <a:schemeClr val="bg2"/>
-                </a:solidFill>
-                <a:latin typeface="+mj-lt"/>
-              </a:defRPr>
-            </a:lvl1pPr>
-            <a:lvl2pPr>
-              <a:defRPr sz="1800">
-                <a:latin typeface="+mj-lt"/>
-              </a:defRPr>
-            </a:lvl2pPr>
-            <a:lvl3pPr>
-              <a:defRPr sz="1800">
-                <a:latin typeface="+mj-lt"/>
-              </a:defRPr>
-            </a:lvl3pPr>
-            <a:lvl4pPr>
-              <a:defRPr sz="1800">
-                <a:latin typeface="+mj-lt"/>
-              </a:defRPr>
-            </a:lvl4pPr>
-            <a:lvl5pPr>
-              <a:defRPr sz="1800">
-                <a:latin typeface="+mj-lt"/>
-              </a:defRPr>
-            </a:lvl5pPr>
-          </a:lstStyle>
-          <a:p>
-            <a:pPr lvl="0"/>
-            <a:r>
-              <a:rPr lang="en-US"/>
-              <a:t>05</a:t>
-            </a:r>
-          </a:p>
-        </p:txBody>
-      </p:sp>
-      <p:sp>
-        <p:nvSpPr>
-          <p:cNvPr id="23" name="content_item5_1">
+          <p:cNvPr id="23" name="content_item5">
             <a:extLst>
               <a:ext uri="{FF2B5EF4-FFF2-40B4-BE49-F238E27FC236}">
                 <a16:creationId xmlns:a16="http://schemas.microsoft.com/office/drawing/2014/main" id="{48632D52-9F72-E6F7-9843-8646F95B5FA3}"/>
@@ -3747,71 +3445,7 @@
       </p:sp>
       <p:sp>
         <p:nvSpPr>
-          <p:cNvPr id="3" name="number_item6_1">
-            <a:extLst>
-              <a:ext uri="{FF2B5EF4-FFF2-40B4-BE49-F238E27FC236}">
-                <a16:creationId xmlns:a16="http://schemas.microsoft.com/office/drawing/2014/main" id="{346343EE-8A7A-4634-E149-70C93B1BBD96}"/>
-              </a:ext>
-            </a:extLst>
-          </p:cNvPr>
-          <p:cNvSpPr>
-            <a:spLocks noGrp="1"/>
-          </p:cNvSpPr>
-          <p:nvPr>
-            <p:ph type="body" sz="quarter" idx="33" hasCustomPrompt="1"/>
-          </p:nvPr>
-        </p:nvSpPr>
-        <p:spPr>
-          <a:xfrm>
-            <a:off x="6285543" y="4902003"/>
-            <a:ext cx="511674" cy="444763"/>
-          </a:xfrm>
-        </p:spPr>
-        <p:txBody>
-          <a:bodyPr anchor="ctr"/>
-          <a:lstStyle>
-            <a:lvl1pPr marL="0" indent="0" algn="ctr">
-              <a:buNone/>
-              <a:defRPr sz="1800" b="1">
-                <a:solidFill>
-                  <a:schemeClr val="bg2"/>
-                </a:solidFill>
-                <a:latin typeface="+mj-lt"/>
-              </a:defRPr>
-            </a:lvl1pPr>
-            <a:lvl2pPr>
-              <a:defRPr sz="1800">
-                <a:latin typeface="+mj-lt"/>
-              </a:defRPr>
-            </a:lvl2pPr>
-            <a:lvl3pPr>
-              <a:defRPr sz="1800">
-                <a:latin typeface="+mj-lt"/>
-              </a:defRPr>
-            </a:lvl3pPr>
-            <a:lvl4pPr>
-              <a:defRPr sz="1800">
-                <a:latin typeface="+mj-lt"/>
-              </a:defRPr>
-            </a:lvl4pPr>
-            <a:lvl5pPr>
-              <a:defRPr sz="1800">
-                <a:latin typeface="+mj-lt"/>
-              </a:defRPr>
-            </a:lvl5pPr>
-          </a:lstStyle>
-          <a:p>
-            <a:pPr lvl="0"/>
-            <a:r>
-              <a:rPr lang="en-US" dirty="0"/>
-              <a:t>06</a:t>
-            </a:r>
-          </a:p>
-        </p:txBody>
-      </p:sp>
-      <p:sp>
-        <p:nvSpPr>
-          <p:cNvPr id="14" name="content_item6_1">
+          <p:cNvPr id="14" name="content_item6">
             <a:extLst>
               <a:ext uri="{FF2B5EF4-FFF2-40B4-BE49-F238E27FC236}">
                 <a16:creationId xmlns:a16="http://schemas.microsoft.com/office/drawing/2014/main" id="{E70FC2D7-E550-F15F-22CE-FCD2FD90E5B0}"/>
@@ -3888,7 +3522,7 @@
       </p:sp>
       <p:sp>
         <p:nvSpPr>
-          <p:cNvPr id="21" name="date_footer_1">
+          <p:cNvPr id="21" name="date_footer">
             <a:extLst>
               <a:ext uri="{FF2B5EF4-FFF2-40B4-BE49-F238E27FC236}">
                 <a16:creationId xmlns:a16="http://schemas.microsoft.com/office/drawing/2014/main" id="{F983A593-F38C-8AFA-FE6A-B7359628514D}"/>
@@ -3914,7 +3548,7 @@
           <a:p>
             <a:fld id="{EC529286-92C0-9541-AD8C-01D6C4AD1D19}" type="datetimeFigureOut">
               <a:rPr lang="en-AU" smtClean="0"/>
-              <a:t>22/6/2025</a:t>
+              <a:t>7/7/2025</a:t>
             </a:fld>
             <a:endParaRPr lang="en-AU" dirty="0"/>
           </a:p>
@@ -3922,7 +3556,7 @@
       </p:sp>
       <p:sp>
         <p:nvSpPr>
-          <p:cNvPr id="25" name="footer_footer_1">
+          <p:cNvPr id="25" name="footer_footer">
             <a:extLst>
               <a:ext uri="{FF2B5EF4-FFF2-40B4-BE49-F238E27FC236}">
                 <a16:creationId xmlns:a16="http://schemas.microsoft.com/office/drawing/2014/main" id="{3704991B-DDAA-2769-42ED-44927C9842A2}"/>
@@ -3952,7 +3586,7 @@
       </p:sp>
       <p:sp>
         <p:nvSpPr>
-          <p:cNvPr id="26" name="slide_number_footer_1">
+          <p:cNvPr id="26" name="slide_number_footer">
             <a:extLst>
               <a:ext uri="{FF2B5EF4-FFF2-40B4-BE49-F238E27FC236}">
                 <a16:creationId xmlns:a16="http://schemas.microsoft.com/office/drawing/2014/main" id="{41615C5F-6DB5-9390-FA55-46987A73A418}"/>
@@ -4016,7 +3650,7 @@
       </p:grpSpPr>
       <p:sp>
         <p:nvSpPr>
-          <p:cNvPr id="2" name="title_top_1">
+          <p:cNvPr id="2" name="slide_title">
             <a:extLst>
               <a:ext uri="{FF2B5EF4-FFF2-40B4-BE49-F238E27FC236}">
                 <a16:creationId xmlns:a16="http://schemas.microsoft.com/office/drawing/2014/main" id="{666A9F42-7FF7-F803-C075-BC4968D35E34}"/>
@@ -4185,67 +3819,22 @@
           </a:lstStyle>
           <a:p>
             <a:pPr algn="ctr"/>
-            <a:endParaRPr lang="en-US" altLang="zh-CN" b="1" noProof="1">
-              <a:solidFill>
-                <a:schemeClr val="bg2"/>
-              </a:solidFill>
-              <a:latin typeface="+mj-lt"/>
-              <a:ea typeface="+mj-ea"/>
-            </a:endParaRPr>
-          </a:p>
-        </p:txBody>
-      </p:sp>
-      <p:sp>
-        <p:nvSpPr>
-          <p:cNvPr id="7" name="content_25">
-            <a:extLst>
-              <a:ext uri="{FF2B5EF4-FFF2-40B4-BE49-F238E27FC236}">
-                <a16:creationId xmlns:a16="http://schemas.microsoft.com/office/drawing/2014/main" id="{1CA25D2A-079E-516D-CCAD-9201655031B8}"/>
-              </a:ext>
-            </a:extLst>
-          </p:cNvPr>
-          <p:cNvSpPr>
-            <a:spLocks noGrp="1"/>
-          </p:cNvSpPr>
-          <p:nvPr>
-            <p:ph type="body" sz="quarter" idx="25" hasCustomPrompt="1"/>
-          </p:nvPr>
-        </p:nvSpPr>
-        <p:spPr>
-          <a:xfrm>
-            <a:off x="4529139" y="2598738"/>
-            <a:ext cx="462842" cy="468312"/>
-          </a:xfrm>
-        </p:spPr>
-        <p:txBody>
-          <a:bodyPr anchor="ctr"/>
-          <a:lstStyle>
-            <a:lvl1pPr marL="0" indent="0" algn="ctr">
-              <a:spcBef>
-                <a:spcPts val="0"/>
-              </a:spcBef>
-              <a:buNone/>
-              <a:defRPr b="1">
+            <a:r>
+              <a:rPr lang="en-US" altLang="zh-CN" b="1" noProof="1">
                 <a:solidFill>
                   <a:schemeClr val="bg2"/>
                 </a:solidFill>
                 <a:latin typeface="+mj-lt"/>
-              </a:defRPr>
-            </a:lvl1pPr>
-          </a:lstStyle>
-          <a:p>
-            <a:pPr lvl="0"/>
-            <a:r>
-              <a:rPr lang="en-US" altLang="zh-CN"/>
+                <a:ea typeface="+mj-ea"/>
+              </a:rPr>
               <a:t>01</a:t>
             </a:r>
-            <a:endParaRPr lang="zh-CN" altLang="en-US"/>
-          </a:p>
-        </p:txBody>
-      </p:sp>
-      <p:sp>
-        <p:nvSpPr>
-          <p:cNvPr id="39" name="content_13">
+          </a:p>
+        </p:txBody>
+      </p:sp>
+      <p:sp>
+        <p:nvSpPr>
+          <p:cNvPr id="39" name="Title1">
             <a:extLst>
               <a:ext uri="{FF2B5EF4-FFF2-40B4-BE49-F238E27FC236}">
                 <a16:creationId xmlns:a16="http://schemas.microsoft.com/office/drawing/2014/main" id="{BC32326B-44AF-69A5-8950-3E83EB14E481}"/>
@@ -4337,7 +3926,7 @@
       </p:sp>
       <p:sp>
         <p:nvSpPr>
-          <p:cNvPr id="38" name="content_14">
+          <p:cNvPr id="38" name="Content1">
             <a:extLst>
               <a:ext uri="{FF2B5EF4-FFF2-40B4-BE49-F238E27FC236}">
                 <a16:creationId xmlns:a16="http://schemas.microsoft.com/office/drawing/2014/main" id="{CCC11960-F75C-F63F-D4E4-8C19C5B89901}"/>
@@ -4572,67 +4161,22 @@
           </a:lstStyle>
           <a:p>
             <a:pPr algn="ctr"/>
-            <a:endParaRPr lang="en-US" altLang="zh-CN" b="1" noProof="1">
-              <a:solidFill>
-                <a:schemeClr val="bg2"/>
-              </a:solidFill>
-              <a:latin typeface="+mj-lt"/>
-              <a:ea typeface="+mj-ea"/>
-            </a:endParaRPr>
-          </a:p>
-        </p:txBody>
-      </p:sp>
-      <p:sp>
-        <p:nvSpPr>
-          <p:cNvPr id="8" name="content_26">
-            <a:extLst>
-              <a:ext uri="{FF2B5EF4-FFF2-40B4-BE49-F238E27FC236}">
-                <a16:creationId xmlns:a16="http://schemas.microsoft.com/office/drawing/2014/main" id="{6CDFDE77-EF7F-9B62-D5CB-295BB8C3EBBD}"/>
-              </a:ext>
-            </a:extLst>
-          </p:cNvPr>
-          <p:cNvSpPr>
-            <a:spLocks noGrp="1"/>
-          </p:cNvSpPr>
-          <p:nvPr>
-            <p:ph type="body" sz="quarter" idx="26" hasCustomPrompt="1"/>
-          </p:nvPr>
-        </p:nvSpPr>
-        <p:spPr>
-          <a:xfrm>
-            <a:off x="4529139" y="3922159"/>
-            <a:ext cx="462842" cy="468312"/>
-          </a:xfrm>
-        </p:spPr>
-        <p:txBody>
-          <a:bodyPr anchor="ctr"/>
-          <a:lstStyle>
-            <a:lvl1pPr marL="0" indent="0" algn="ctr">
-              <a:spcBef>
-                <a:spcPts val="0"/>
-              </a:spcBef>
-              <a:buNone/>
-              <a:defRPr b="1">
+            <a:r>
+              <a:rPr lang="en-US" altLang="zh-CN" b="1" noProof="1">
                 <a:solidFill>
                   <a:schemeClr val="bg2"/>
                 </a:solidFill>
                 <a:latin typeface="+mj-lt"/>
-              </a:defRPr>
-            </a:lvl1pPr>
-          </a:lstStyle>
-          <a:p>
-            <a:pPr lvl="0"/>
-            <a:r>
-              <a:rPr lang="en-US" altLang="zh-CN"/>
+                <a:ea typeface="+mj-ea"/>
+              </a:rPr>
               <a:t>02</a:t>
             </a:r>
-            <a:endParaRPr lang="zh-CN" altLang="en-US"/>
-          </a:p>
-        </p:txBody>
-      </p:sp>
-      <p:sp>
-        <p:nvSpPr>
-          <p:cNvPr id="44" name="content_item1_1">
+          </a:p>
+        </p:txBody>
+      </p:sp>
+      <p:sp>
+        <p:nvSpPr>
+          <p:cNvPr id="44" name="Title2">
             <a:extLst>
               <a:ext uri="{FF2B5EF4-FFF2-40B4-BE49-F238E27FC236}">
                 <a16:creationId xmlns:a16="http://schemas.microsoft.com/office/drawing/2014/main" id="{0290AD35-CF09-6504-D01E-4C05D706F1C1}"/>
@@ -4724,7 +4268,7 @@
       </p:sp>
       <p:sp>
         <p:nvSpPr>
-          <p:cNvPr id="43" name="content_17">
+          <p:cNvPr id="43" name="Content3">
             <a:extLst>
               <a:ext uri="{FF2B5EF4-FFF2-40B4-BE49-F238E27FC236}">
                 <a16:creationId xmlns:a16="http://schemas.microsoft.com/office/drawing/2014/main" id="{05368349-BD70-533F-1B19-8FD3F67FB75C}"/>
@@ -4831,7 +4375,99 @@
       </p:sp>
       <p:sp>
         <p:nvSpPr>
-          <p:cNvPr id="20" name="Rectangle 3">
+          <p:cNvPr id="49" name="Title3">
+            <a:extLst>
+              <a:ext uri="{FF2B5EF4-FFF2-40B4-BE49-F238E27FC236}">
+                <a16:creationId xmlns:a16="http://schemas.microsoft.com/office/drawing/2014/main" id="{C7E3638A-E47B-2C16-051A-8CB00B9F895C}"/>
+              </a:ext>
+            </a:extLst>
+          </p:cNvPr>
+          <p:cNvSpPr>
+            <a:spLocks noGrp="1"/>
+          </p:cNvSpPr>
+          <p:nvPr>
+            <p:ph type="body" sz="quarter" idx="22"/>
+          </p:nvPr>
+        </p:nvSpPr>
+        <p:spPr>
+          <a:xfrm>
+            <a:off x="832162" y="4732585"/>
+            <a:ext cx="3530468" cy="739384"/>
+          </a:xfrm>
+        </p:spPr>
+        <p:txBody>
+          <a:bodyPr anchor="b"/>
+          <a:lstStyle>
+            <a:lvl1pPr marL="0" indent="0" algn="r">
+              <a:lnSpc>
+                <a:spcPct val="100000"/>
+              </a:lnSpc>
+              <a:buNone/>
+              <a:defRPr sz="1800" b="1">
+                <a:latin typeface="+mj-lt"/>
+              </a:defRPr>
+            </a:lvl1pPr>
+            <a:lvl2pPr algn="r">
+              <a:lnSpc>
+                <a:spcPct val="100000"/>
+              </a:lnSpc>
+              <a:defRPr sz="1800" b="1">
+                <a:latin typeface="+mj-lt"/>
+              </a:defRPr>
+            </a:lvl2pPr>
+            <a:lvl3pPr algn="r">
+              <a:lnSpc>
+                <a:spcPct val="100000"/>
+              </a:lnSpc>
+              <a:defRPr sz="1800" b="1">
+                <a:latin typeface="+mj-lt"/>
+              </a:defRPr>
+            </a:lvl3pPr>
+            <a:lvl4pPr algn="r">
+              <a:lnSpc>
+                <a:spcPct val="100000"/>
+              </a:lnSpc>
+              <a:defRPr sz="1800" b="1">
+                <a:latin typeface="+mj-lt"/>
+              </a:defRPr>
+            </a:lvl4pPr>
+            <a:lvl5pPr algn="r">
+              <a:lnSpc>
+                <a:spcPct val="100000"/>
+              </a:lnSpc>
+              <a:defRPr sz="1800" b="1">
+                <a:latin typeface="+mj-lt"/>
+              </a:defRPr>
+            </a:lvl5pPr>
+          </a:lstStyle>
+          <a:p>
+            <a:pPr marL="0" marR="0" lvl="0" indent="0" algn="r" defTabSz="914400" rtl="0" eaLnBrk="1" fontAlgn="auto" latinLnBrk="0" hangingPunct="1">
+              <a:lnSpc>
+                <a:spcPct val="100000"/>
+              </a:lnSpc>
+              <a:spcBef>
+                <a:spcPts val="1000"/>
+              </a:spcBef>
+              <a:spcAft>
+                <a:spcPts val="0"/>
+              </a:spcAft>
+              <a:buClrTx/>
+              <a:buSzTx/>
+              <a:buFont typeface="Arial" panose="020B0604020202020204" pitchFamily="34" charset="0"/>
+              <a:buNone/>
+              <a:tabLst/>
+              <a:defRPr/>
+            </a:pPr>
+            <a:r>
+              <a:rPr lang="en-GB" altLang="zh-CN"/>
+              <a:t>Click to edit Master text styles</a:t>
+            </a:r>
+          </a:p>
+        </p:txBody>
+      </p:sp>
+      <p:sp>
+        <p:nvSpPr>
+          <p:cNvPr id="20" name="Rectangle_3">
             <a:extLst>
               <a:ext uri="{FF2B5EF4-FFF2-40B4-BE49-F238E27FC236}">
                 <a16:creationId xmlns:a16="http://schemas.microsoft.com/office/drawing/2014/main" id="{CAC0BE5A-3FD4-01C0-EFCD-142421774C08}"/>
@@ -4959,159 +4595,22 @@
           </a:lstStyle>
           <a:p>
             <a:pPr algn="ctr"/>
-            <a:endParaRPr lang="en-US" altLang="zh-CN" b="1" noProof="1">
-              <a:solidFill>
-                <a:schemeClr val="bg2"/>
-              </a:solidFill>
-              <a:latin typeface="+mj-lt"/>
-              <a:ea typeface="+mj-ea"/>
-            </a:endParaRPr>
-          </a:p>
-        </p:txBody>
-      </p:sp>
-      <p:sp>
-        <p:nvSpPr>
-          <p:cNvPr id="9" name="content_27">
-            <a:extLst>
-              <a:ext uri="{FF2B5EF4-FFF2-40B4-BE49-F238E27FC236}">
-                <a16:creationId xmlns:a16="http://schemas.microsoft.com/office/drawing/2014/main" id="{867C06B3-86F3-BA14-C074-170923D252F1}"/>
-              </a:ext>
-            </a:extLst>
-          </p:cNvPr>
-          <p:cNvSpPr>
-            <a:spLocks noGrp="1"/>
-          </p:cNvSpPr>
-          <p:nvPr>
-            <p:ph type="body" sz="quarter" idx="27" hasCustomPrompt="1"/>
-          </p:nvPr>
-        </p:nvSpPr>
-        <p:spPr>
-          <a:xfrm>
-            <a:off x="4529139" y="5245581"/>
-            <a:ext cx="462842" cy="468312"/>
-          </a:xfrm>
-        </p:spPr>
-        <p:txBody>
-          <a:bodyPr anchor="ctr"/>
-          <a:lstStyle>
-            <a:lvl1pPr marL="0" indent="0" algn="ctr">
-              <a:spcBef>
-                <a:spcPts val="0"/>
-              </a:spcBef>
-              <a:buNone/>
-              <a:defRPr b="1">
+            <a:r>
+              <a:rPr lang="en-US" altLang="zh-CN" b="1" noProof="1">
                 <a:solidFill>
                   <a:schemeClr val="bg2"/>
                 </a:solidFill>
                 <a:latin typeface="+mj-lt"/>
-              </a:defRPr>
-            </a:lvl1pPr>
-          </a:lstStyle>
-          <a:p>
-            <a:pPr lvl="0"/>
-            <a:r>
-              <a:rPr lang="en-US" altLang="zh-CN" dirty="0"/>
+                <a:ea typeface="+mj-ea"/>
+              </a:rPr>
               <a:t>03</a:t>
             </a:r>
-            <a:endParaRPr lang="zh-CN" altLang="en-US" dirty="0"/>
-          </a:p>
-        </p:txBody>
-      </p:sp>
-      <p:sp>
-        <p:nvSpPr>
-          <p:cNvPr id="49" name="content_item3_1">
-            <a:extLst>
-              <a:ext uri="{FF2B5EF4-FFF2-40B4-BE49-F238E27FC236}">
-                <a16:creationId xmlns:a16="http://schemas.microsoft.com/office/drawing/2014/main" id="{C7E3638A-E47B-2C16-051A-8CB00B9F895C}"/>
-              </a:ext>
-            </a:extLst>
-          </p:cNvPr>
-          <p:cNvSpPr>
-            <a:spLocks noGrp="1"/>
-          </p:cNvSpPr>
-          <p:nvPr>
-            <p:ph type="body" sz="quarter" idx="22"/>
-          </p:nvPr>
-        </p:nvSpPr>
-        <p:spPr>
-          <a:xfrm>
-            <a:off x="832162" y="4732585"/>
-            <a:ext cx="3530468" cy="739384"/>
-          </a:xfrm>
-        </p:spPr>
-        <p:txBody>
-          <a:bodyPr anchor="b"/>
-          <a:lstStyle>
-            <a:lvl1pPr marL="0" indent="0" algn="r">
-              <a:lnSpc>
-                <a:spcPct val="100000"/>
-              </a:lnSpc>
-              <a:buNone/>
-              <a:defRPr sz="1800" b="1">
-                <a:latin typeface="+mj-lt"/>
-              </a:defRPr>
-            </a:lvl1pPr>
-            <a:lvl2pPr algn="r">
-              <a:lnSpc>
-                <a:spcPct val="100000"/>
-              </a:lnSpc>
-              <a:defRPr sz="1800" b="1">
-                <a:latin typeface="+mj-lt"/>
-              </a:defRPr>
-            </a:lvl2pPr>
-            <a:lvl3pPr algn="r">
-              <a:lnSpc>
-                <a:spcPct val="100000"/>
-              </a:lnSpc>
-              <a:defRPr sz="1800" b="1">
-                <a:latin typeface="+mj-lt"/>
-              </a:defRPr>
-            </a:lvl3pPr>
-            <a:lvl4pPr algn="r">
-              <a:lnSpc>
-                <a:spcPct val="100000"/>
-              </a:lnSpc>
-              <a:defRPr sz="1800" b="1">
-                <a:latin typeface="+mj-lt"/>
-              </a:defRPr>
-            </a:lvl4pPr>
-            <a:lvl5pPr algn="r">
-              <a:lnSpc>
-                <a:spcPct val="100000"/>
-              </a:lnSpc>
-              <a:defRPr sz="1800" b="1">
-                <a:latin typeface="+mj-lt"/>
-              </a:defRPr>
-            </a:lvl5pPr>
-          </a:lstStyle>
-          <a:p>
-            <a:pPr marL="0" marR="0" lvl="0" indent="0" algn="r" defTabSz="914400" rtl="0" eaLnBrk="1" fontAlgn="auto" latinLnBrk="0" hangingPunct="1">
-              <a:lnSpc>
-                <a:spcPct val="100000"/>
-              </a:lnSpc>
-              <a:spcBef>
-                <a:spcPts val="1000"/>
-              </a:spcBef>
-              <a:spcAft>
-                <a:spcPts val="0"/>
-              </a:spcAft>
-              <a:buClrTx/>
-              <a:buSzTx/>
-              <a:buFont typeface="Arial" panose="020B0604020202020204" pitchFamily="34" charset="0"/>
-              <a:buNone/>
-              <a:tabLst/>
-              <a:defRPr/>
-            </a:pPr>
-            <a:r>
-              <a:rPr lang="en-GB" altLang="zh-CN"/>
-              <a:t>Click to edit Master text styles</a:t>
-            </a:r>
-          </a:p>
-        </p:txBody>
-      </p:sp>
-      <p:sp>
-        <p:nvSpPr>
-          <p:cNvPr id="48" name="content_item5_1">
+          </a:p>
+        </p:txBody>
+      </p:sp>
+      <p:sp>
+        <p:nvSpPr>
+          <p:cNvPr id="48" name="Content3">
             <a:extLst>
               <a:ext uri="{FF2B5EF4-FFF2-40B4-BE49-F238E27FC236}">
                 <a16:creationId xmlns:a16="http://schemas.microsoft.com/office/drawing/2014/main" id="{5A4CC468-3A85-49F0-099C-BC1F0F566DC3}"/>
@@ -5346,67 +4845,22 @@
           </a:lstStyle>
           <a:p>
             <a:pPr algn="ctr"/>
-            <a:endParaRPr lang="en-US" altLang="zh-CN" b="1" noProof="1">
-              <a:solidFill>
-                <a:schemeClr val="bg2"/>
-              </a:solidFill>
-              <a:latin typeface="+mj-lt"/>
-              <a:ea typeface="+mj-ea"/>
-            </a:endParaRPr>
-          </a:p>
-        </p:txBody>
-      </p:sp>
-      <p:sp>
-        <p:nvSpPr>
-          <p:cNvPr id="15" name="number_item3_1">
-            <a:extLst>
-              <a:ext uri="{FF2B5EF4-FFF2-40B4-BE49-F238E27FC236}">
-                <a16:creationId xmlns:a16="http://schemas.microsoft.com/office/drawing/2014/main" id="{2E5F3B0A-2795-1AB7-EDA7-048B8FFC1801}"/>
-              </a:ext>
-            </a:extLst>
-          </p:cNvPr>
-          <p:cNvSpPr>
-            <a:spLocks noGrp="1"/>
-          </p:cNvSpPr>
-          <p:nvPr>
-            <p:ph type="body" sz="quarter" idx="30" hasCustomPrompt="1"/>
-          </p:nvPr>
-        </p:nvSpPr>
-        <p:spPr>
-          <a:xfrm>
-            <a:off x="7181203" y="5245581"/>
-            <a:ext cx="462842" cy="468312"/>
-          </a:xfrm>
-        </p:spPr>
-        <p:txBody>
-          <a:bodyPr anchor="ctr"/>
-          <a:lstStyle>
-            <a:lvl1pPr marL="0" indent="0" algn="ctr">
-              <a:spcBef>
-                <a:spcPts val="0"/>
-              </a:spcBef>
-              <a:buNone/>
-              <a:defRPr b="1">
+            <a:r>
+              <a:rPr lang="en-US" altLang="zh-CN" b="1" noProof="1">
                 <a:solidFill>
                   <a:schemeClr val="bg2"/>
                 </a:solidFill>
                 <a:latin typeface="+mj-lt"/>
-              </a:defRPr>
-            </a:lvl1pPr>
-          </a:lstStyle>
-          <a:p>
-            <a:pPr lvl="0"/>
-            <a:r>
-              <a:rPr lang="en-US" altLang="zh-CN"/>
+                <a:ea typeface="+mj-ea"/>
+              </a:rPr>
               <a:t>04</a:t>
             </a:r>
-            <a:endParaRPr lang="zh-CN" altLang="en-US"/>
-          </a:p>
-        </p:txBody>
-      </p:sp>
-      <p:sp>
-        <p:nvSpPr>
-          <p:cNvPr id="51" name="content_24">
+          </a:p>
+        </p:txBody>
+      </p:sp>
+      <p:sp>
+        <p:nvSpPr>
+          <p:cNvPr id="51" name="Title6">
             <a:extLst>
               <a:ext uri="{FF2B5EF4-FFF2-40B4-BE49-F238E27FC236}">
                 <a16:creationId xmlns:a16="http://schemas.microsoft.com/office/drawing/2014/main" id="{0F680350-5C6D-05CD-2861-1CBCFF6E39DA}"/>
@@ -5498,7 +4952,7 @@
       </p:sp>
       <p:sp>
         <p:nvSpPr>
-          <p:cNvPr id="50" name="content_23">
+          <p:cNvPr id="50" name="Content6">
             <a:extLst>
               <a:ext uri="{FF2B5EF4-FFF2-40B4-BE49-F238E27FC236}">
                 <a16:creationId xmlns:a16="http://schemas.microsoft.com/office/drawing/2014/main" id="{66541D57-A12D-E924-D596-DE278CD7F4D7}"/>
@@ -5733,67 +5187,22 @@
           </a:lstStyle>
           <a:p>
             <a:pPr algn="ctr"/>
-            <a:endParaRPr lang="en-US" altLang="zh-CN" b="1" noProof="1">
-              <a:solidFill>
-                <a:schemeClr val="bg2"/>
-              </a:solidFill>
-              <a:latin typeface="+mj-lt"/>
-              <a:ea typeface="+mj-ea"/>
-            </a:endParaRPr>
-          </a:p>
-        </p:txBody>
-      </p:sp>
-      <p:sp>
-        <p:nvSpPr>
-          <p:cNvPr id="14" name="number_item2_1">
-            <a:extLst>
-              <a:ext uri="{FF2B5EF4-FFF2-40B4-BE49-F238E27FC236}">
-                <a16:creationId xmlns:a16="http://schemas.microsoft.com/office/drawing/2014/main" id="{E73C2B03-4A5F-AABA-EC88-7F080083184F}"/>
-              </a:ext>
-            </a:extLst>
-          </p:cNvPr>
-          <p:cNvSpPr>
-            <a:spLocks noGrp="1"/>
-          </p:cNvSpPr>
-          <p:nvPr>
-            <p:ph type="body" sz="quarter" idx="29" hasCustomPrompt="1"/>
-          </p:nvPr>
-        </p:nvSpPr>
-        <p:spPr>
-          <a:xfrm>
-            <a:off x="7181203" y="3922160"/>
-            <a:ext cx="462842" cy="468312"/>
-          </a:xfrm>
-        </p:spPr>
-        <p:txBody>
-          <a:bodyPr anchor="ctr"/>
-          <a:lstStyle>
-            <a:lvl1pPr marL="0" indent="0" algn="ctr">
-              <a:spcBef>
-                <a:spcPts val="0"/>
-              </a:spcBef>
-              <a:buNone/>
-              <a:defRPr b="1">
+            <a:r>
+              <a:rPr lang="en-US" altLang="zh-CN" b="1" noProof="1">
                 <a:solidFill>
                   <a:schemeClr val="bg2"/>
                 </a:solidFill>
                 <a:latin typeface="+mj-lt"/>
-              </a:defRPr>
-            </a:lvl1pPr>
-          </a:lstStyle>
-          <a:p>
-            <a:pPr lvl="0"/>
-            <a:r>
-              <a:rPr lang="en-US" altLang="zh-CN"/>
+                <a:ea typeface="+mj-ea"/>
+              </a:rPr>
               <a:t>05</a:t>
             </a:r>
-            <a:endParaRPr lang="zh-CN" altLang="en-US"/>
-          </a:p>
-        </p:txBody>
-      </p:sp>
-      <p:sp>
-        <p:nvSpPr>
-          <p:cNvPr id="46" name="content_item2_1">
+          </a:p>
+        </p:txBody>
+      </p:sp>
+      <p:sp>
+        <p:nvSpPr>
+          <p:cNvPr id="46" name="Title5">
             <a:extLst>
               <a:ext uri="{FF2B5EF4-FFF2-40B4-BE49-F238E27FC236}">
                 <a16:creationId xmlns:a16="http://schemas.microsoft.com/office/drawing/2014/main" id="{9EBEE5F4-6259-F130-927E-7FFB60A40FD6}"/>
@@ -5885,7 +5294,7 @@
       </p:sp>
       <p:sp>
         <p:nvSpPr>
-          <p:cNvPr id="45" name="content_item4_1">
+          <p:cNvPr id="45" name="Content5">
             <a:extLst>
               <a:ext uri="{FF2B5EF4-FFF2-40B4-BE49-F238E27FC236}">
                 <a16:creationId xmlns:a16="http://schemas.microsoft.com/office/drawing/2014/main" id="{66237AC4-EBD4-DD9E-69D9-8D385F6C75A6}"/>
@@ -6120,67 +5529,22 @@
           </a:lstStyle>
           <a:p>
             <a:pPr algn="ctr"/>
-            <a:endParaRPr lang="en-US" altLang="zh-CN" b="1" noProof="1">
-              <a:solidFill>
-                <a:schemeClr val="bg2"/>
-              </a:solidFill>
-              <a:latin typeface="+mj-lt"/>
-              <a:ea typeface="+mj-ea"/>
-            </a:endParaRPr>
-          </a:p>
-        </p:txBody>
-      </p:sp>
-      <p:sp>
-        <p:nvSpPr>
-          <p:cNvPr id="13" name="number_item1_1">
-            <a:extLst>
-              <a:ext uri="{FF2B5EF4-FFF2-40B4-BE49-F238E27FC236}">
-                <a16:creationId xmlns:a16="http://schemas.microsoft.com/office/drawing/2014/main" id="{5DB5C80C-26F8-0C95-154F-6DEEEDB32371}"/>
-              </a:ext>
-            </a:extLst>
-          </p:cNvPr>
-          <p:cNvSpPr>
-            <a:spLocks noGrp="1"/>
-          </p:cNvSpPr>
-          <p:nvPr>
-            <p:ph type="body" sz="quarter" idx="28" hasCustomPrompt="1"/>
-          </p:nvPr>
-        </p:nvSpPr>
-        <p:spPr>
-          <a:xfrm>
-            <a:off x="7181203" y="2598738"/>
-            <a:ext cx="462842" cy="468312"/>
-          </a:xfrm>
-        </p:spPr>
-        <p:txBody>
-          <a:bodyPr anchor="ctr"/>
-          <a:lstStyle>
-            <a:lvl1pPr marL="0" indent="0" algn="ctr">
-              <a:spcBef>
-                <a:spcPts val="0"/>
-              </a:spcBef>
-              <a:buNone/>
-              <a:defRPr b="1">
+            <a:r>
+              <a:rPr lang="en-US" altLang="zh-CN" b="1" noProof="1">
                 <a:solidFill>
                   <a:schemeClr val="bg2"/>
                 </a:solidFill>
                 <a:latin typeface="+mj-lt"/>
-              </a:defRPr>
-            </a:lvl1pPr>
-          </a:lstStyle>
-          <a:p>
-            <a:pPr lvl="0"/>
-            <a:r>
-              <a:rPr lang="en-US" altLang="zh-CN"/>
+                <a:ea typeface="+mj-ea"/>
+              </a:rPr>
               <a:t>06</a:t>
             </a:r>
-            <a:endParaRPr lang="zh-CN" altLang="en-US"/>
-          </a:p>
-        </p:txBody>
-      </p:sp>
-      <p:sp>
-        <p:nvSpPr>
-          <p:cNvPr id="41" name="content_16">
+          </a:p>
+        </p:txBody>
+      </p:sp>
+      <p:sp>
+        <p:nvSpPr>
+          <p:cNvPr id="41" name="Title4">
             <a:extLst>
               <a:ext uri="{FF2B5EF4-FFF2-40B4-BE49-F238E27FC236}">
                 <a16:creationId xmlns:a16="http://schemas.microsoft.com/office/drawing/2014/main" id="{1580A2FB-D18E-CCE5-D7D5-AB29B0225C05}"/>
@@ -6272,7 +5636,7 @@
       </p:sp>
       <p:sp>
         <p:nvSpPr>
-          <p:cNvPr id="40" name="content_15">
+          <p:cNvPr id="40" name="Content4">
             <a:extLst>
               <a:ext uri="{FF2B5EF4-FFF2-40B4-BE49-F238E27FC236}">
                 <a16:creationId xmlns:a16="http://schemas.microsoft.com/office/drawing/2014/main" id="{8B832846-EB9F-5EFA-F397-ED05D7CD5CBB}"/>
@@ -7536,7 +6900,7 @@
       </p:sp>
       <p:sp>
         <p:nvSpPr>
-          <p:cNvPr id="3" name="date_footer_1">
+          <p:cNvPr id="3" name="date_footer">
             <a:extLst>
               <a:ext uri="{FF2B5EF4-FFF2-40B4-BE49-F238E27FC236}">
                 <a16:creationId xmlns:a16="http://schemas.microsoft.com/office/drawing/2014/main" id="{5A8B6810-D233-996D-4DDF-C06BD0CB9A5A}"/>
@@ -7562,7 +6926,7 @@
           <a:p>
             <a:fld id="{EC529286-92C0-9541-AD8C-01D6C4AD1D19}" type="datetimeFigureOut">
               <a:rPr lang="en-AU" smtClean="0"/>
-              <a:t>22/6/2025</a:t>
+              <a:t>7/7/2025</a:t>
             </a:fld>
             <a:endParaRPr lang="en-AU" dirty="0"/>
           </a:p>
@@ -7570,7 +6934,7 @@
       </p:sp>
       <p:sp>
         <p:nvSpPr>
-          <p:cNvPr id="4" name="footer_footer_1">
+          <p:cNvPr id="4" name="footer_footer">
             <a:extLst>
               <a:ext uri="{FF2B5EF4-FFF2-40B4-BE49-F238E27FC236}">
                 <a16:creationId xmlns:a16="http://schemas.microsoft.com/office/drawing/2014/main" id="{EFC8C12A-DE08-BA6B-0CED-4D57F46C9680}"/>
@@ -7600,7 +6964,7 @@
       </p:sp>
       <p:sp>
         <p:nvSpPr>
-          <p:cNvPr id="5" name="slide_number_footer_1">
+          <p:cNvPr id="5" name="slide_number_footer">
             <a:extLst>
               <a:ext uri="{FF2B5EF4-FFF2-40B4-BE49-F238E27FC236}">
                 <a16:creationId xmlns:a16="http://schemas.microsoft.com/office/drawing/2014/main" id="{15B3EF65-8890-DC92-F5F2-8E60B6F35305}"/>
@@ -7664,7 +7028,7 @@
       </p:grpSpPr>
       <p:sp>
         <p:nvSpPr>
-          <p:cNvPr id="2" name="title_top_1">
+          <p:cNvPr id="2" name="title_top">
             <a:extLst>
               <a:ext uri="{FF2B5EF4-FFF2-40B4-BE49-F238E27FC236}">
                 <a16:creationId xmlns:a16="http://schemas.microsoft.com/office/drawing/2014/main" id="{E4336E9A-8E96-CD8C-7598-F87632CD81CF}"/>
@@ -7707,7 +7071,7 @@
       </p:sp>
       <p:sp>
         <p:nvSpPr>
-          <p:cNvPr id="3" name="content_1">
+          <p:cNvPr id="3" name="content">
             <a:extLst>
               <a:ext uri="{FF2B5EF4-FFF2-40B4-BE49-F238E27FC236}">
                 <a16:creationId xmlns:a16="http://schemas.microsoft.com/office/drawing/2014/main" id="{2BDC76B8-60F6-62D3-9F73-E81662203017}"/>
@@ -7783,7 +7147,7 @@
       </p:sp>
       <p:sp>
         <p:nvSpPr>
-          <p:cNvPr id="4" name="date_footer_1">
+          <p:cNvPr id="4" name="date_footer">
             <a:extLst>
               <a:ext uri="{FF2B5EF4-FFF2-40B4-BE49-F238E27FC236}">
                 <a16:creationId xmlns:a16="http://schemas.microsoft.com/office/drawing/2014/main" id="{5C740740-642A-05CB-CC9F-1DC9240B260E}"/>
@@ -7809,7 +7173,7 @@
           <a:p>
             <a:fld id="{EC529286-92C0-9541-AD8C-01D6C4AD1D19}" type="datetimeFigureOut">
               <a:rPr lang="en-AU" smtClean="0"/>
-              <a:t>22/6/2025</a:t>
+              <a:t>7/7/2025</a:t>
             </a:fld>
             <a:endParaRPr lang="en-AU" dirty="0"/>
           </a:p>
@@ -7817,7 +7181,7 @@
       </p:sp>
       <p:sp>
         <p:nvSpPr>
-          <p:cNvPr id="5" name="footer_footer_1">
+          <p:cNvPr id="5" name="footer_footer">
             <a:extLst>
               <a:ext uri="{FF2B5EF4-FFF2-40B4-BE49-F238E27FC236}">
                 <a16:creationId xmlns:a16="http://schemas.microsoft.com/office/drawing/2014/main" id="{885655D9-AA5E-F291-7A59-6B22014D4037}"/>
@@ -7847,7 +7211,7 @@
       </p:sp>
       <p:sp>
         <p:nvSpPr>
-          <p:cNvPr id="6" name="slide_number_footer_1">
+          <p:cNvPr id="6" name="slide_number_footer">
             <a:extLst>
               <a:ext uri="{FF2B5EF4-FFF2-40B4-BE49-F238E27FC236}">
                 <a16:creationId xmlns:a16="http://schemas.microsoft.com/office/drawing/2014/main" id="{F49B6A9E-B05B-5C4F-FA33-8D5E0A9E2338}"/>
@@ -7927,7 +7291,7 @@
       </p:grpSpPr>
       <p:sp>
         <p:nvSpPr>
-          <p:cNvPr id="2" name="date_footer_1">
+          <p:cNvPr id="2" name="date_footer">
             <a:extLst>
               <a:ext uri="{FF2B5EF4-FFF2-40B4-BE49-F238E27FC236}">
                 <a16:creationId xmlns:a16="http://schemas.microsoft.com/office/drawing/2014/main" id="{96C81B9D-47B6-B0B5-2504-6CFC56639DAC}"/>
@@ -7948,7 +7312,7 @@
           <a:p>
             <a:fld id="{626B0BCA-A8D4-8D47-B4D9-B8F6CDA51159}" type="datetimeFigureOut">
               <a:rPr lang="en-AU" smtClean="0"/>
-              <a:t>22/6/2025</a:t>
+              <a:t>7/7/2025</a:t>
             </a:fld>
             <a:endParaRPr lang="en-AU"/>
           </a:p>
@@ -7956,7 +7320,7 @@
       </p:sp>
       <p:sp>
         <p:nvSpPr>
-          <p:cNvPr id="3" name="footer_footer_1">
+          <p:cNvPr id="3" name="footer_footer">
             <a:extLst>
               <a:ext uri="{FF2B5EF4-FFF2-40B4-BE49-F238E27FC236}">
                 <a16:creationId xmlns:a16="http://schemas.microsoft.com/office/drawing/2014/main" id="{9B911889-8BA3-6D6C-44C3-ACA9D77471AD}"/>
@@ -7981,7 +7345,7 @@
       </p:sp>
       <p:sp>
         <p:nvSpPr>
-          <p:cNvPr id="4" name="slide_number_footer_1">
+          <p:cNvPr id="4" name="slide_number_footer">
             <a:extLst>
               <a:ext uri="{FF2B5EF4-FFF2-40B4-BE49-F238E27FC236}">
                 <a16:creationId xmlns:a16="http://schemas.microsoft.com/office/drawing/2014/main" id="{CE7A5EE5-3CDF-03B4-3589-866B3437F05C}"/>
@@ -8010,7 +7374,7 @@
       </p:sp>
       <p:sp>
         <p:nvSpPr>
-          <p:cNvPr id="26" name="content_16">
+          <p:cNvPr id="26" name="content_top_left">
             <a:extLst>
               <a:ext uri="{FF2B5EF4-FFF2-40B4-BE49-F238E27FC236}">
                 <a16:creationId xmlns:a16="http://schemas.microsoft.com/office/drawing/2014/main" id="{42E77249-2175-C589-1BF1-E79E0635473A}"/>
@@ -8026,7 +7390,7 @@
         </p:nvSpPr>
         <p:spPr>
           <a:xfrm>
-            <a:off x="6168886" y="3482008"/>
+            <a:off x="589102" y="649077"/>
             <a:ext cx="5434012" cy="2640496"/>
           </a:xfrm>
         </p:spPr>
@@ -8078,7 +7442,7 @@
       </p:sp>
       <p:sp>
         <p:nvSpPr>
-          <p:cNvPr id="27" name="content_17">
+          <p:cNvPr id="27" name="content_top_right">
             <a:extLst>
               <a:ext uri="{FF2B5EF4-FFF2-40B4-BE49-F238E27FC236}">
                 <a16:creationId xmlns:a16="http://schemas.microsoft.com/office/drawing/2014/main" id="{51628B60-961D-665B-F6C3-732491D38BB9}"/>
@@ -8146,7 +7510,7 @@
       </p:sp>
       <p:sp>
         <p:nvSpPr>
-          <p:cNvPr id="28" name="content_18">
+          <p:cNvPr id="28" name="content_bottom_left">
             <a:extLst>
               <a:ext uri="{FF2B5EF4-FFF2-40B4-BE49-F238E27FC236}">
                 <a16:creationId xmlns:a16="http://schemas.microsoft.com/office/drawing/2014/main" id="{D751D188-82D0-B381-C234-7DD4F5EB595C}"/>
@@ -8214,7 +7578,7 @@
       </p:sp>
       <p:sp>
         <p:nvSpPr>
-          <p:cNvPr id="29" name="content_19">
+          <p:cNvPr id="29" name="content_bottom_right">
             <a:extLst>
               <a:ext uri="{FF2B5EF4-FFF2-40B4-BE49-F238E27FC236}">
                 <a16:creationId xmlns:a16="http://schemas.microsoft.com/office/drawing/2014/main" id="{B0A5CF0E-F4A4-002B-E8F8-28011639E48A}"/>
@@ -8230,7 +7594,7 @@
         </p:nvSpPr>
         <p:spPr>
           <a:xfrm>
-            <a:off x="589102" y="639139"/>
+            <a:off x="6168886" y="3482008"/>
             <a:ext cx="5434012" cy="2640496"/>
           </a:xfrm>
         </p:spPr>
@@ -8312,7 +7676,7 @@
       </p:grpSpPr>
       <p:sp>
         <p:nvSpPr>
-          <p:cNvPr id="2" name="title_top_1">
+          <p:cNvPr id="2" name="title_top">
             <a:extLst>
               <a:ext uri="{FF2B5EF4-FFF2-40B4-BE49-F238E27FC236}">
                 <a16:creationId xmlns:a16="http://schemas.microsoft.com/office/drawing/2014/main" id="{936320B5-3B09-2712-F489-3173237EFA24}"/>
@@ -8340,7 +7704,7 @@
       </p:sp>
       <p:sp>
         <p:nvSpPr>
-          <p:cNvPr id="3" name="content_1">
+          <p:cNvPr id="3" name="content">
             <a:extLst>
               <a:ext uri="{FF2B5EF4-FFF2-40B4-BE49-F238E27FC236}">
                 <a16:creationId xmlns:a16="http://schemas.microsoft.com/office/drawing/2014/main" id="{D1E7D0BC-1FE8-F732-1F77-1B44ED986BE9}"/>
@@ -8397,7 +7761,7 @@
       </p:sp>
       <p:sp>
         <p:nvSpPr>
-          <p:cNvPr id="4" name="date_footer_1">
+          <p:cNvPr id="4" name="date_footer">
             <a:extLst>
               <a:ext uri="{FF2B5EF4-FFF2-40B4-BE49-F238E27FC236}">
                 <a16:creationId xmlns:a16="http://schemas.microsoft.com/office/drawing/2014/main" id="{F3E8509B-696E-FF26-4FE1-44C368900807}"/>
@@ -8418,7 +7782,7 @@
           <a:p>
             <a:fld id="{EC529286-92C0-9541-AD8C-01D6C4AD1D19}" type="datetimeFigureOut">
               <a:rPr lang="en-US" smtClean="0"/>
-              <a:t>6/22/25</a:t>
+              <a:t>7/7/25</a:t>
             </a:fld>
             <a:endParaRPr lang="en-US"/>
           </a:p>
@@ -8426,7 +7790,7 @@
       </p:sp>
       <p:sp>
         <p:nvSpPr>
-          <p:cNvPr id="5" name="footer_footer_1">
+          <p:cNvPr id="5" name="footer_footer">
             <a:extLst>
               <a:ext uri="{FF2B5EF4-FFF2-40B4-BE49-F238E27FC236}">
                 <a16:creationId xmlns:a16="http://schemas.microsoft.com/office/drawing/2014/main" id="{5C9DFDB6-CF10-BC20-2915-3DC022E29350}"/>
@@ -8451,7 +7815,7 @@
       </p:sp>
       <p:sp>
         <p:nvSpPr>
-          <p:cNvPr id="6" name="slide_number_footer_1">
+          <p:cNvPr id="6" name="slide_number_footer">
             <a:extLst>
               <a:ext uri="{FF2B5EF4-FFF2-40B4-BE49-F238E27FC236}">
                 <a16:creationId xmlns:a16="http://schemas.microsoft.com/office/drawing/2014/main" id="{711CADE5-6EB6-4288-1EE2-979A6CBD57C3}"/>
@@ -8510,7 +7874,7 @@
       </p:grpSpPr>
       <p:sp>
         <p:nvSpPr>
-          <p:cNvPr id="2" name="title_top_1">
+          <p:cNvPr id="2" name="title_top">
             <a:extLst>
               <a:ext uri="{FF2B5EF4-FFF2-40B4-BE49-F238E27FC236}">
                 <a16:creationId xmlns:a16="http://schemas.microsoft.com/office/drawing/2014/main" id="{DEBE0B7E-AA23-739F-44BB-2AB172CAAFA4}"/>
@@ -8547,7 +7911,7 @@
       </p:sp>
       <p:sp>
         <p:nvSpPr>
-          <p:cNvPr id="3" name="text_1">
+          <p:cNvPr id="3" name="text">
             <a:extLst>
               <a:ext uri="{FF2B5EF4-FFF2-40B4-BE49-F238E27FC236}">
                 <a16:creationId xmlns:a16="http://schemas.microsoft.com/office/drawing/2014/main" id="{5AC24772-3DA8-7B98-01F5-8ECAC2A39C1A}"/>
@@ -8672,7 +8036,7 @@
       </p:sp>
       <p:sp>
         <p:nvSpPr>
-          <p:cNvPr id="4" name="date_footer_1">
+          <p:cNvPr id="4" name="date_footer">
             <a:extLst>
               <a:ext uri="{FF2B5EF4-FFF2-40B4-BE49-F238E27FC236}">
                 <a16:creationId xmlns:a16="http://schemas.microsoft.com/office/drawing/2014/main" id="{25527903-74DF-8563-E5E8-46A8C8576813}"/>
@@ -8693,7 +8057,7 @@
           <a:p>
             <a:fld id="{EC529286-92C0-9541-AD8C-01D6C4AD1D19}" type="datetimeFigureOut">
               <a:rPr lang="en-US" smtClean="0"/>
-              <a:t>6/22/25</a:t>
+              <a:t>7/7/25</a:t>
             </a:fld>
             <a:endParaRPr lang="en-US"/>
           </a:p>
@@ -8701,7 +8065,7 @@
       </p:sp>
       <p:sp>
         <p:nvSpPr>
-          <p:cNvPr id="5" name="footer_footer_1">
+          <p:cNvPr id="5" name="footer_footer">
             <a:extLst>
               <a:ext uri="{FF2B5EF4-FFF2-40B4-BE49-F238E27FC236}">
                 <a16:creationId xmlns:a16="http://schemas.microsoft.com/office/drawing/2014/main" id="{03FCDC84-DADA-4EFE-32E6-651C07CF5FD9}"/>
@@ -8726,7 +8090,7 @@
       </p:sp>
       <p:sp>
         <p:nvSpPr>
-          <p:cNvPr id="6" name="slide_number_footer_1">
+          <p:cNvPr id="6" name="slide_number_footer">
             <a:extLst>
               <a:ext uri="{FF2B5EF4-FFF2-40B4-BE49-F238E27FC236}">
                 <a16:creationId xmlns:a16="http://schemas.microsoft.com/office/drawing/2014/main" id="{640EF1B5-6CED-6D09-9DC0-95F299570B9D}"/>
@@ -8785,7 +8149,7 @@
       </p:grpSpPr>
       <p:sp>
         <p:nvSpPr>
-          <p:cNvPr id="2" name="title_top_1">
+          <p:cNvPr id="2" name="title_top">
             <a:extLst>
               <a:ext uri="{FF2B5EF4-FFF2-40B4-BE49-F238E27FC236}">
                 <a16:creationId xmlns:a16="http://schemas.microsoft.com/office/drawing/2014/main" id="{0F38DD02-1D84-971F-219D-ABEAF1D81409}"/>
@@ -8813,7 +8177,7 @@
       </p:sp>
       <p:sp>
         <p:nvSpPr>
-          <p:cNvPr id="3" name="content_left_1">
+          <p:cNvPr id="3" name="content_left">
             <a:extLst>
               <a:ext uri="{FF2B5EF4-FFF2-40B4-BE49-F238E27FC236}">
                 <a16:creationId xmlns:a16="http://schemas.microsoft.com/office/drawing/2014/main" id="{68779667-283B-01FA-8294-375A07C9C724}"/>
@@ -8875,7 +8239,7 @@
       </p:sp>
       <p:sp>
         <p:nvSpPr>
-          <p:cNvPr id="4" name="content_right_1">
+          <p:cNvPr id="4" name="content_right">
             <a:extLst>
               <a:ext uri="{FF2B5EF4-FFF2-40B4-BE49-F238E27FC236}">
                 <a16:creationId xmlns:a16="http://schemas.microsoft.com/office/drawing/2014/main" id="{3CA78424-686E-19C4-2223-AD3644EAF431}"/>
@@ -8937,7 +8301,7 @@
       </p:sp>
       <p:sp>
         <p:nvSpPr>
-          <p:cNvPr id="5" name="date_footer_1">
+          <p:cNvPr id="5" name="date_footer">
             <a:extLst>
               <a:ext uri="{FF2B5EF4-FFF2-40B4-BE49-F238E27FC236}">
                 <a16:creationId xmlns:a16="http://schemas.microsoft.com/office/drawing/2014/main" id="{A50666D6-FACE-CBAE-DE7A-6833FEBFDAEA}"/>
@@ -8958,7 +8322,7 @@
           <a:p>
             <a:fld id="{EC529286-92C0-9541-AD8C-01D6C4AD1D19}" type="datetimeFigureOut">
               <a:rPr lang="en-US" smtClean="0"/>
-              <a:t>6/22/25</a:t>
+              <a:t>7/7/25</a:t>
             </a:fld>
             <a:endParaRPr lang="en-US"/>
           </a:p>
@@ -8966,7 +8330,7 @@
       </p:sp>
       <p:sp>
         <p:nvSpPr>
-          <p:cNvPr id="6" name="footer_footer_1">
+          <p:cNvPr id="6" name="footer_footer">
             <a:extLst>
               <a:ext uri="{FF2B5EF4-FFF2-40B4-BE49-F238E27FC236}">
                 <a16:creationId xmlns:a16="http://schemas.microsoft.com/office/drawing/2014/main" id="{CB84FBD2-6A70-6780-629A-6DCACAC4C5C3}"/>
@@ -8991,7 +8355,7 @@
       </p:sp>
       <p:sp>
         <p:nvSpPr>
-          <p:cNvPr id="7" name="slide_number_footer_1">
+          <p:cNvPr id="7" name="slide_number_footer">
             <a:extLst>
               <a:ext uri="{FF2B5EF4-FFF2-40B4-BE49-F238E27FC236}">
                 <a16:creationId xmlns:a16="http://schemas.microsoft.com/office/drawing/2014/main" id="{28B8B21C-ADF8-9AEC-B1C2-1FB0D14F71A0}"/>
@@ -9050,7 +8414,7 @@
       </p:grpSpPr>
       <p:sp>
         <p:nvSpPr>
-          <p:cNvPr id="2" name="title_top_1">
+          <p:cNvPr id="2" name="title_top">
             <a:extLst>
               <a:ext uri="{FF2B5EF4-FFF2-40B4-BE49-F238E27FC236}">
                 <a16:creationId xmlns:a16="http://schemas.microsoft.com/office/drawing/2014/main" id="{344942AA-343E-93BC-7C95-F3A7D2AFD359}"/>
@@ -9083,7 +8447,7 @@
       </p:sp>
       <p:sp>
         <p:nvSpPr>
-          <p:cNvPr id="3" name="title_left_1">
+          <p:cNvPr id="3" name="title_left">
             <a:extLst>
               <a:ext uri="{FF2B5EF4-FFF2-40B4-BE49-F238E27FC236}">
                 <a16:creationId xmlns:a16="http://schemas.microsoft.com/office/drawing/2014/main" id="{3B99860B-8335-4A2C-01D6-61113F7BE8E3}"/>
@@ -9154,7 +8518,7 @@
       </p:sp>
       <p:sp>
         <p:nvSpPr>
-          <p:cNvPr id="4" name="content_left_1">
+          <p:cNvPr id="4" name="content_left">
             <a:extLst>
               <a:ext uri="{FF2B5EF4-FFF2-40B4-BE49-F238E27FC236}">
                 <a16:creationId xmlns:a16="http://schemas.microsoft.com/office/drawing/2014/main" id="{24111872-E559-20AA-D15F-0CC5729BE44C}"/>
@@ -9216,7 +8580,7 @@
       </p:sp>
       <p:sp>
         <p:nvSpPr>
-          <p:cNvPr id="5" name="title_right_1">
+          <p:cNvPr id="5" name="title_right">
             <a:extLst>
               <a:ext uri="{FF2B5EF4-FFF2-40B4-BE49-F238E27FC236}">
                 <a16:creationId xmlns:a16="http://schemas.microsoft.com/office/drawing/2014/main" id="{30D71C89-F5B5-EEA8-F9D1-63D1A3DB59CF}"/>
@@ -9287,7 +8651,7 @@
       </p:sp>
       <p:sp>
         <p:nvSpPr>
-          <p:cNvPr id="6" name="content_right_1">
+          <p:cNvPr id="6" name="content_right">
             <a:extLst>
               <a:ext uri="{FF2B5EF4-FFF2-40B4-BE49-F238E27FC236}">
                 <a16:creationId xmlns:a16="http://schemas.microsoft.com/office/drawing/2014/main" id="{02AD09D2-6A5B-C3BF-30D1-C8A8A681F147}"/>
@@ -9349,7 +8713,7 @@
       </p:sp>
       <p:sp>
         <p:nvSpPr>
-          <p:cNvPr id="7" name="date_footer_1">
+          <p:cNvPr id="7" name="date_footer">
             <a:extLst>
               <a:ext uri="{FF2B5EF4-FFF2-40B4-BE49-F238E27FC236}">
                 <a16:creationId xmlns:a16="http://schemas.microsoft.com/office/drawing/2014/main" id="{4D572917-F65B-6EDF-0060-213541FE1469}"/>
@@ -9370,7 +8734,7 @@
           <a:p>
             <a:fld id="{EC529286-92C0-9541-AD8C-01D6C4AD1D19}" type="datetimeFigureOut">
               <a:rPr lang="en-US" smtClean="0"/>
-              <a:t>6/22/25</a:t>
+              <a:t>7/7/25</a:t>
             </a:fld>
             <a:endParaRPr lang="en-US"/>
           </a:p>
@@ -9378,7 +8742,7 @@
       </p:sp>
       <p:sp>
         <p:nvSpPr>
-          <p:cNvPr id="8" name="footer_footer_1">
+          <p:cNvPr id="8" name="footer_footer">
             <a:extLst>
               <a:ext uri="{FF2B5EF4-FFF2-40B4-BE49-F238E27FC236}">
                 <a16:creationId xmlns:a16="http://schemas.microsoft.com/office/drawing/2014/main" id="{1B3F2CD2-8359-7886-0193-1BC7F1FB2276}"/>
@@ -9403,7 +8767,7 @@
       </p:sp>
       <p:sp>
         <p:nvSpPr>
-          <p:cNvPr id="9" name="slide_number_footer_1">
+          <p:cNvPr id="9" name="slide_number_footer">
             <a:extLst>
               <a:ext uri="{FF2B5EF4-FFF2-40B4-BE49-F238E27FC236}">
                 <a16:creationId xmlns:a16="http://schemas.microsoft.com/office/drawing/2014/main" id="{AF74797B-ACEA-E082-B62D-DC01F3C830EE}"/>
@@ -9462,7 +8826,7 @@
       </p:grpSpPr>
       <p:sp>
         <p:nvSpPr>
-          <p:cNvPr id="2" name="title_top_1">
+          <p:cNvPr id="2" name="title_top">
             <a:extLst>
               <a:ext uri="{FF2B5EF4-FFF2-40B4-BE49-F238E27FC236}">
                 <a16:creationId xmlns:a16="http://schemas.microsoft.com/office/drawing/2014/main" id="{4A03CBFB-B82C-66BE-0186-1379617348B2}"/>
@@ -9490,7 +8854,7 @@
       </p:sp>
       <p:sp>
         <p:nvSpPr>
-          <p:cNvPr id="3" name="date_footer_1">
+          <p:cNvPr id="3" name="date_footer">
             <a:extLst>
               <a:ext uri="{FF2B5EF4-FFF2-40B4-BE49-F238E27FC236}">
                 <a16:creationId xmlns:a16="http://schemas.microsoft.com/office/drawing/2014/main" id="{87D4F309-CC62-3032-2EE7-33F4976FC508}"/>
@@ -9511,7 +8875,7 @@
           <a:p>
             <a:fld id="{EC529286-92C0-9541-AD8C-01D6C4AD1D19}" type="datetimeFigureOut">
               <a:rPr lang="en-US" smtClean="0"/>
-              <a:t>6/22/25</a:t>
+              <a:t>7/7/25</a:t>
             </a:fld>
             <a:endParaRPr lang="en-US"/>
           </a:p>
@@ -9519,7 +8883,7 @@
       </p:sp>
       <p:sp>
         <p:nvSpPr>
-          <p:cNvPr id="4" name="footer_footer_1">
+          <p:cNvPr id="4" name="footer_footer">
             <a:extLst>
               <a:ext uri="{FF2B5EF4-FFF2-40B4-BE49-F238E27FC236}">
                 <a16:creationId xmlns:a16="http://schemas.microsoft.com/office/drawing/2014/main" id="{690FF4BC-7595-6782-038E-E0CE5A45A10D}"/>
@@ -9544,7 +8908,7 @@
       </p:sp>
       <p:sp>
         <p:nvSpPr>
-          <p:cNvPr id="5" name="slide_number_footer_1">
+          <p:cNvPr id="5" name="slide_number_footer">
             <a:extLst>
               <a:ext uri="{FF2B5EF4-FFF2-40B4-BE49-F238E27FC236}">
                 <a16:creationId xmlns:a16="http://schemas.microsoft.com/office/drawing/2014/main" id="{57249B9B-302A-3551-62F9-777EF78DC4F1}"/>
@@ -9603,7 +8967,7 @@
       </p:grpSpPr>
       <p:sp>
         <p:nvSpPr>
-          <p:cNvPr id="2" name="date_footer_1">
+          <p:cNvPr id="2" name="date_footer">
             <a:extLst>
               <a:ext uri="{FF2B5EF4-FFF2-40B4-BE49-F238E27FC236}">
                 <a16:creationId xmlns:a16="http://schemas.microsoft.com/office/drawing/2014/main" id="{7E144A57-1D3F-753F-432B-D6103D24EEED}"/>
@@ -9624,7 +8988,7 @@
           <a:p>
             <a:fld id="{EC529286-92C0-9541-AD8C-01D6C4AD1D19}" type="datetimeFigureOut">
               <a:rPr lang="en-US" smtClean="0"/>
-              <a:t>6/22/25</a:t>
+              <a:t>7/7/25</a:t>
             </a:fld>
             <a:endParaRPr lang="en-US"/>
           </a:p>
@@ -9632,7 +8996,7 @@
       </p:sp>
       <p:sp>
         <p:nvSpPr>
-          <p:cNvPr id="3" name="footer_footer_1">
+          <p:cNvPr id="3" name="footer_footer">
             <a:extLst>
               <a:ext uri="{FF2B5EF4-FFF2-40B4-BE49-F238E27FC236}">
                 <a16:creationId xmlns:a16="http://schemas.microsoft.com/office/drawing/2014/main" id="{E81DD142-52A3-259B-59C3-04F714479E2E}"/>
@@ -9657,7 +9021,7 @@
       </p:sp>
       <p:sp>
         <p:nvSpPr>
-          <p:cNvPr id="4" name="slide_number_footer_1">
+          <p:cNvPr id="4" name="slide_number_footer">
             <a:extLst>
               <a:ext uri="{FF2B5EF4-FFF2-40B4-BE49-F238E27FC236}">
                 <a16:creationId xmlns:a16="http://schemas.microsoft.com/office/drawing/2014/main" id="{00E1BFDE-AF7A-27C2-8B42-1BF393B6FC64}"/>
@@ -9716,7 +9080,7 @@
       </p:grpSpPr>
       <p:sp>
         <p:nvSpPr>
-          <p:cNvPr id="2" name="title_top_1">
+          <p:cNvPr id="2" name="title_top">
             <a:extLst>
               <a:ext uri="{FF2B5EF4-FFF2-40B4-BE49-F238E27FC236}">
                 <a16:creationId xmlns:a16="http://schemas.microsoft.com/office/drawing/2014/main" id="{78BE29A6-8C68-A0E7-DB00-1EC2C4A15E19}"/>
@@ -9753,7 +9117,7 @@
       </p:sp>
       <p:sp>
         <p:nvSpPr>
-          <p:cNvPr id="3" name="content_1">
+          <p:cNvPr id="3" name="content">
             <a:extLst>
               <a:ext uri="{FF2B5EF4-FFF2-40B4-BE49-F238E27FC236}">
                 <a16:creationId xmlns:a16="http://schemas.microsoft.com/office/drawing/2014/main" id="{EE9B037F-072D-604E-3087-C6AB2E273A79}"/>
@@ -9843,7 +9207,7 @@
       </p:sp>
       <p:sp>
         <p:nvSpPr>
-          <p:cNvPr id="4" name="text_caption_1">
+          <p:cNvPr id="4" name="text_caption">
             <a:extLst>
               <a:ext uri="{FF2B5EF4-FFF2-40B4-BE49-F238E27FC236}">
                 <a16:creationId xmlns:a16="http://schemas.microsoft.com/office/drawing/2014/main" id="{7F2EF8C8-D6E6-30C3-71CB-BAB3D0ACBBCA}"/>
@@ -9914,7 +9278,7 @@
       </p:sp>
       <p:sp>
         <p:nvSpPr>
-          <p:cNvPr id="5" name="date_footer_1">
+          <p:cNvPr id="5" name="date_footer">
             <a:extLst>
               <a:ext uri="{FF2B5EF4-FFF2-40B4-BE49-F238E27FC236}">
                 <a16:creationId xmlns:a16="http://schemas.microsoft.com/office/drawing/2014/main" id="{9A855646-1485-4EEF-2DC6-BA01D494EE58}"/>
@@ -9935,7 +9299,7 @@
           <a:p>
             <a:fld id="{EC529286-92C0-9541-AD8C-01D6C4AD1D19}" type="datetimeFigureOut">
               <a:rPr lang="en-US" smtClean="0"/>
-              <a:t>6/22/25</a:t>
+              <a:t>7/7/25</a:t>
             </a:fld>
             <a:endParaRPr lang="en-US"/>
           </a:p>
@@ -9943,7 +9307,7 @@
       </p:sp>
       <p:sp>
         <p:nvSpPr>
-          <p:cNvPr id="6" name="footer_footer_1">
+          <p:cNvPr id="6" name="footer_footer">
             <a:extLst>
               <a:ext uri="{FF2B5EF4-FFF2-40B4-BE49-F238E27FC236}">
                 <a16:creationId xmlns:a16="http://schemas.microsoft.com/office/drawing/2014/main" id="{C531B637-EAF5-C59B-4F74-92DEEA6EA007}"/>
@@ -9968,7 +9332,7 @@
       </p:sp>
       <p:sp>
         <p:nvSpPr>
-          <p:cNvPr id="7" name="slide_number_footer_1">
+          <p:cNvPr id="7" name="slide_number_footer">
             <a:extLst>
               <a:ext uri="{FF2B5EF4-FFF2-40B4-BE49-F238E27FC236}">
                 <a16:creationId xmlns:a16="http://schemas.microsoft.com/office/drawing/2014/main" id="{B0B3D9EC-D2F8-9494-9FA1-70AE91FDA253}"/>
@@ -10027,7 +9391,7 @@
       </p:grpSpPr>
       <p:sp>
         <p:nvSpPr>
-          <p:cNvPr id="2" name="title_top_1">
+          <p:cNvPr id="2" name="title_top">
             <a:extLst>
               <a:ext uri="{FF2B5EF4-FFF2-40B4-BE49-F238E27FC236}">
                 <a16:creationId xmlns:a16="http://schemas.microsoft.com/office/drawing/2014/main" id="{7D87E6D3-569E-0B7F-EEA9-88F852060802}"/>
@@ -10064,7 +9428,7 @@
       </p:sp>
       <p:sp>
         <p:nvSpPr>
-          <p:cNvPr id="3" name="image_1">
+          <p:cNvPr id="3" name="image">
             <a:extLst>
               <a:ext uri="{FF2B5EF4-FFF2-40B4-BE49-F238E27FC236}">
                 <a16:creationId xmlns:a16="http://schemas.microsoft.com/office/drawing/2014/main" id="{626C9B64-94EB-4E47-3135-E27D435C37BE}"/>
@@ -10131,7 +9495,7 @@
       </p:sp>
       <p:sp>
         <p:nvSpPr>
-          <p:cNvPr id="4" name="text_caption_1">
+          <p:cNvPr id="4" name="text_caption">
             <a:extLst>
               <a:ext uri="{FF2B5EF4-FFF2-40B4-BE49-F238E27FC236}">
                 <a16:creationId xmlns:a16="http://schemas.microsoft.com/office/drawing/2014/main" id="{EC045B9E-FD0B-2317-0A55-F4A0876CA926}"/>
@@ -10202,7 +9566,7 @@
       </p:sp>
       <p:sp>
         <p:nvSpPr>
-          <p:cNvPr id="5" name="date_footer_1">
+          <p:cNvPr id="5" name="date_footer">
             <a:extLst>
               <a:ext uri="{FF2B5EF4-FFF2-40B4-BE49-F238E27FC236}">
                 <a16:creationId xmlns:a16="http://schemas.microsoft.com/office/drawing/2014/main" id="{880E2CA8-9924-8AF8-CE6F-D5EC88A5BEC3}"/>
@@ -10223,7 +9587,7 @@
           <a:p>
             <a:fld id="{EC529286-92C0-9541-AD8C-01D6C4AD1D19}" type="datetimeFigureOut">
               <a:rPr lang="en-US" smtClean="0"/>
-              <a:t>6/22/25</a:t>
+              <a:t>7/7/25</a:t>
             </a:fld>
             <a:endParaRPr lang="en-US"/>
           </a:p>
@@ -10231,7 +9595,7 @@
       </p:sp>
       <p:sp>
         <p:nvSpPr>
-          <p:cNvPr id="6" name="footer_footer_1">
+          <p:cNvPr id="6" name="footer_footer">
             <a:extLst>
               <a:ext uri="{FF2B5EF4-FFF2-40B4-BE49-F238E27FC236}">
                 <a16:creationId xmlns:a16="http://schemas.microsoft.com/office/drawing/2014/main" id="{5FB106BC-9E7F-B6A4-E169-055C3A5C1F5C}"/>
@@ -10256,7 +9620,7 @@
       </p:sp>
       <p:sp>
         <p:nvSpPr>
-          <p:cNvPr id="7" name="slide_number_footer_1">
+          <p:cNvPr id="7" name="slide_number_footer">
             <a:extLst>
               <a:ext uri="{FF2B5EF4-FFF2-40B4-BE49-F238E27FC236}">
                 <a16:creationId xmlns:a16="http://schemas.microsoft.com/office/drawing/2014/main" id="{AA0BDA70-9B77-5C84-99B8-149EA1AC529C}"/>
@@ -10464,7 +9828,7 @@
           <a:p>
             <a:fld id="{EC529286-92C0-9541-AD8C-01D6C4AD1D19}" type="datetimeFigureOut">
               <a:rPr lang="en-US" smtClean="0"/>
-              <a:t>6/22/25</a:t>
+              <a:t>7/7/25</a:t>
             </a:fld>
             <a:endParaRPr lang="en-US"/>
           </a:p>

</xml_diff>

<commit_message>
🐛 Fix content placement and template JSON issues
- Remove all legacy content blocks from master template files
- Convert to pure structured frontmatter with correct field mappings
- Fix JSON syntax errors and trailing commas
- Enhance error messages with warning icons and specific filenames
- Fix array handling in converter for structured frontmatter
- Add comprehensive field name variations for image and SWOT layouts
- Remove "content" from skip list to enable content field processing
- Update CLI error handling to show specific JSON filenames
- Format code with black and fix bandit security warnings

🤖 Generated with [Claude Code](https://claude.ai/code)

Co-Authored-By: Claude <noreply@anthropic.com>
</commit_message>
<xml_diff>
--- a/src/deckbuilder/assets/templates/default.pptx
+++ b/src/deckbuilder/assets/templates/default.pptx
@@ -259,7 +259,7 @@
           <a:p>
             <a:fld id="{EC529286-92C0-9541-AD8C-01D6C4AD1D19}" type="datetimeFigureOut">
               <a:rPr lang="en-US" smtClean="0"/>
-              <a:t>7/7/25</a:t>
+              <a:t>7/8/25</a:t>
             </a:fld>
             <a:endParaRPr lang="en-US"/>
           </a:p>
@@ -473,7 +473,7 @@
           <a:p>
             <a:fld id="{EC529286-92C0-9541-AD8C-01D6C4AD1D19}" type="datetimeFigureOut">
               <a:rPr lang="en-US" smtClean="0"/>
-              <a:t>7/7/25</a:t>
+              <a:t>7/8/25</a:t>
             </a:fld>
             <a:endParaRPr lang="en-US"/>
           </a:p>
@@ -681,7 +681,7 @@
           <a:p>
             <a:fld id="{EC529286-92C0-9541-AD8C-01D6C4AD1D19}" type="datetimeFigureOut">
               <a:rPr lang="en-US" smtClean="0"/>
-              <a:t>7/7/25</a:t>
+              <a:t>7/8/25</a:t>
             </a:fld>
             <a:endParaRPr lang="en-US"/>
           </a:p>
@@ -1050,7 +1050,7 @@
           <a:p>
             <a:fld id="{EC529286-92C0-9541-AD8C-01D6C4AD1D19}" type="datetimeFigureOut">
               <a:rPr lang="en-AU" smtClean="0"/>
-              <a:t>7/7/2025</a:t>
+              <a:t>8/7/2025</a:t>
             </a:fld>
             <a:endParaRPr lang="en-AU" dirty="0"/>
           </a:p>
@@ -1321,7 +1321,7 @@
           <a:p>
             <a:fld id="{EC529286-92C0-9541-AD8C-01D6C4AD1D19}" type="datetimeFigureOut">
               <a:rPr lang="en-AU" smtClean="0"/>
-              <a:t>7/7/2025</a:t>
+              <a:t>8/7/2025</a:t>
             </a:fld>
             <a:endParaRPr lang="en-AU" dirty="0"/>
           </a:p>
@@ -1782,7 +1782,7 @@
           <a:p>
             <a:fld id="{EC529286-92C0-9541-AD8C-01D6C4AD1D19}" type="datetimeFigureOut">
               <a:rPr lang="en-AU" smtClean="0"/>
-              <a:t>7/7/2025</a:t>
+              <a:t>8/7/2025</a:t>
             </a:fld>
             <a:endParaRPr lang="en-AU" dirty="0"/>
           </a:p>
@@ -2075,7 +2075,7 @@
           <a:p>
             <a:fld id="{EC529286-92C0-9541-AD8C-01D6C4AD1D19}" type="datetimeFigureOut">
               <a:rPr lang="en-AU" smtClean="0"/>
-              <a:t>7/7/2025</a:t>
+              <a:t>8/7/2025</a:t>
             </a:fld>
             <a:endParaRPr lang="en-AU" dirty="0"/>
           </a:p>
@@ -3548,7 +3548,7 @@
           <a:p>
             <a:fld id="{EC529286-92C0-9541-AD8C-01D6C4AD1D19}" type="datetimeFigureOut">
               <a:rPr lang="en-AU" smtClean="0"/>
-              <a:t>7/7/2025</a:t>
+              <a:t>8/7/2025</a:t>
             </a:fld>
             <a:endParaRPr lang="en-AU" dirty="0"/>
           </a:p>
@@ -4268,7 +4268,7 @@
       </p:sp>
       <p:sp>
         <p:nvSpPr>
-          <p:cNvPr id="43" name="Content3">
+          <p:cNvPr id="43" name="Content2">
             <a:extLst>
               <a:ext uri="{FF2B5EF4-FFF2-40B4-BE49-F238E27FC236}">
                 <a16:creationId xmlns:a16="http://schemas.microsoft.com/office/drawing/2014/main" id="{05368349-BD70-533F-1B19-8FD3F67FB75C}"/>
@@ -6926,7 +6926,7 @@
           <a:p>
             <a:fld id="{EC529286-92C0-9541-AD8C-01D6C4AD1D19}" type="datetimeFigureOut">
               <a:rPr lang="en-AU" smtClean="0"/>
-              <a:t>7/7/2025</a:t>
+              <a:t>8/7/2025</a:t>
             </a:fld>
             <a:endParaRPr lang="en-AU" dirty="0"/>
           </a:p>
@@ -7173,7 +7173,7 @@
           <a:p>
             <a:fld id="{EC529286-92C0-9541-AD8C-01D6C4AD1D19}" type="datetimeFigureOut">
               <a:rPr lang="en-AU" smtClean="0"/>
-              <a:t>7/7/2025</a:t>
+              <a:t>8/7/2025</a:t>
             </a:fld>
             <a:endParaRPr lang="en-AU" dirty="0"/>
           </a:p>
@@ -7312,7 +7312,7 @@
           <a:p>
             <a:fld id="{626B0BCA-A8D4-8D47-B4D9-B8F6CDA51159}" type="datetimeFigureOut">
               <a:rPr lang="en-AU" smtClean="0"/>
-              <a:t>7/7/2025</a:t>
+              <a:t>8/7/2025</a:t>
             </a:fld>
             <a:endParaRPr lang="en-AU"/>
           </a:p>
@@ -7390,7 +7390,7 @@
         </p:nvSpPr>
         <p:spPr>
           <a:xfrm>
-            <a:off x="589102" y="649077"/>
+            <a:off x="589102" y="976555"/>
             <a:ext cx="5434012" cy="2640496"/>
           </a:xfrm>
         </p:spPr>
@@ -7458,7 +7458,7 @@
         </p:nvSpPr>
         <p:spPr>
           <a:xfrm>
-            <a:off x="6168886" y="639139"/>
+            <a:off x="6168886" y="976555"/>
             <a:ext cx="5434012" cy="2640496"/>
           </a:xfrm>
         </p:spPr>
@@ -7526,8 +7526,8 @@
         </p:nvSpPr>
         <p:spPr>
           <a:xfrm>
-            <a:off x="589102" y="3482008"/>
-            <a:ext cx="5434012" cy="2640496"/>
+            <a:off x="589102" y="3712321"/>
+            <a:ext cx="5434012" cy="2410182"/>
           </a:xfrm>
         </p:spPr>
         <p:txBody>
@@ -7594,8 +7594,8 @@
         </p:nvSpPr>
         <p:spPr>
           <a:xfrm>
-            <a:off x="6168886" y="3482008"/>
-            <a:ext cx="5434012" cy="2640496"/>
+            <a:off x="6168886" y="3733974"/>
+            <a:ext cx="5434012" cy="2388529"/>
           </a:xfrm>
         </p:spPr>
         <p:txBody>
@@ -7641,6 +7641,47 @@
           <a:p>
             <a:pPr lvl="2"/>
             <a:endParaRPr lang="en-AU" dirty="0"/>
+          </a:p>
+        </p:txBody>
+      </p:sp>
+      <p:sp>
+        <p:nvSpPr>
+          <p:cNvPr id="5" name="slide_title">
+            <a:extLst>
+              <a:ext uri="{FF2B5EF4-FFF2-40B4-BE49-F238E27FC236}">
+                <a16:creationId xmlns:a16="http://schemas.microsoft.com/office/drawing/2014/main" id="{1ECC0F9B-5B0D-07EA-0DE4-EAAF6E5CAE9A}"/>
+              </a:ext>
+            </a:extLst>
+          </p:cNvPr>
+          <p:cNvSpPr>
+            <a:spLocks noGrp="1"/>
+          </p:cNvSpPr>
+          <p:nvPr>
+            <p:ph type="title"/>
+          </p:nvPr>
+        </p:nvSpPr>
+        <p:spPr>
+          <a:xfrm>
+            <a:off x="589102" y="184799"/>
+            <a:ext cx="11013796" cy="674832"/>
+          </a:xfrm>
+        </p:spPr>
+        <p:txBody>
+          <a:bodyPr/>
+          <a:lstStyle>
+            <a:lvl1pPr algn="ctr">
+              <a:defRPr sz="3600">
+                <a:solidFill>
+                  <a:schemeClr val="tx1"/>
+                </a:solidFill>
+              </a:defRPr>
+            </a:lvl1pPr>
+          </a:lstStyle>
+          <a:p>
+            <a:r>
+              <a:rPr lang="en-US"/>
+              <a:t>Click to edit Master title style</a:t>
+            </a:r>
           </a:p>
         </p:txBody>
       </p:sp>
@@ -7782,7 +7823,7 @@
           <a:p>
             <a:fld id="{EC529286-92C0-9541-AD8C-01D6C4AD1D19}" type="datetimeFigureOut">
               <a:rPr lang="en-US" smtClean="0"/>
-              <a:t>7/7/25</a:t>
+              <a:t>7/8/25</a:t>
             </a:fld>
             <a:endParaRPr lang="en-US"/>
           </a:p>
@@ -8057,7 +8098,7 @@
           <a:p>
             <a:fld id="{EC529286-92C0-9541-AD8C-01D6C4AD1D19}" type="datetimeFigureOut">
               <a:rPr lang="en-US" smtClean="0"/>
-              <a:t>7/7/25</a:t>
+              <a:t>7/8/25</a:t>
             </a:fld>
             <a:endParaRPr lang="en-US"/>
           </a:p>
@@ -8322,7 +8363,7 @@
           <a:p>
             <a:fld id="{EC529286-92C0-9541-AD8C-01D6C4AD1D19}" type="datetimeFigureOut">
               <a:rPr lang="en-US" smtClean="0"/>
-              <a:t>7/7/25</a:t>
+              <a:t>7/8/25</a:t>
             </a:fld>
             <a:endParaRPr lang="en-US"/>
           </a:p>
@@ -8734,7 +8775,7 @@
           <a:p>
             <a:fld id="{EC529286-92C0-9541-AD8C-01D6C4AD1D19}" type="datetimeFigureOut">
               <a:rPr lang="en-US" smtClean="0"/>
-              <a:t>7/7/25</a:t>
+              <a:t>7/8/25</a:t>
             </a:fld>
             <a:endParaRPr lang="en-US"/>
           </a:p>
@@ -8875,7 +8916,7 @@
           <a:p>
             <a:fld id="{EC529286-92C0-9541-AD8C-01D6C4AD1D19}" type="datetimeFigureOut">
               <a:rPr lang="en-US" smtClean="0"/>
-              <a:t>7/7/25</a:t>
+              <a:t>7/8/25</a:t>
             </a:fld>
             <a:endParaRPr lang="en-US"/>
           </a:p>
@@ -8988,7 +9029,7 @@
           <a:p>
             <a:fld id="{EC529286-92C0-9541-AD8C-01D6C4AD1D19}" type="datetimeFigureOut">
               <a:rPr lang="en-US" smtClean="0"/>
-              <a:t>7/7/25</a:t>
+              <a:t>7/8/25</a:t>
             </a:fld>
             <a:endParaRPr lang="en-US"/>
           </a:p>
@@ -9299,7 +9340,7 @@
           <a:p>
             <a:fld id="{EC529286-92C0-9541-AD8C-01D6C4AD1D19}" type="datetimeFigureOut">
               <a:rPr lang="en-US" smtClean="0"/>
-              <a:t>7/7/25</a:t>
+              <a:t>7/8/25</a:t>
             </a:fld>
             <a:endParaRPr lang="en-US"/>
           </a:p>
@@ -9587,7 +9628,7 @@
           <a:p>
             <a:fld id="{EC529286-92C0-9541-AD8C-01D6C4AD1D19}" type="datetimeFigureOut">
               <a:rPr lang="en-US" smtClean="0"/>
-              <a:t>7/7/25</a:t>
+              <a:t>7/8/25</a:t>
             </a:fld>
             <a:endParaRPr lang="en-US"/>
           </a:p>
@@ -9828,7 +9869,7 @@
           <a:p>
             <a:fld id="{EC529286-92C0-9541-AD8C-01D6C4AD1D19}" type="datetimeFigureOut">
               <a:rPr lang="en-US" smtClean="0"/>
-              <a:t>7/7/25</a:t>
+              <a:t>7/8/25</a:t>
             </a:fld>
             <a:endParaRPr lang="en-US"/>
           </a:p>

</xml_diff>

<commit_message>
Update to v1.2.4: Enhanced markdown processing with comprehensive bullet/heading support
🤖 Generated with [Claude Code](https://claude.ai/code)

Co-Authored-By: Claude <noreply@anthropic.com>
</commit_message>
<xml_diff>
--- a/src/deckbuilder/assets/templates/default.pptx
+++ b/src/deckbuilder/assets/templates/default.pptx
@@ -259,7 +259,7 @@
           <a:p>
             <a:fld id="{EC529286-92C0-9541-AD8C-01D6C4AD1D19}" type="datetimeFigureOut">
               <a:rPr lang="en-US" smtClean="0"/>
-              <a:t>7/14/25</a:t>
+              <a:t>7/15/25</a:t>
             </a:fld>
             <a:endParaRPr lang="en-US"/>
           </a:p>
@@ -473,7 +473,7 @@
           <a:p>
             <a:fld id="{EC529286-92C0-9541-AD8C-01D6C4AD1D19}" type="datetimeFigureOut">
               <a:rPr lang="en-US" smtClean="0"/>
-              <a:t>7/14/25</a:t>
+              <a:t>7/15/25</a:t>
             </a:fld>
             <a:endParaRPr lang="en-US"/>
           </a:p>
@@ -681,7 +681,7 @@
           <a:p>
             <a:fld id="{EC529286-92C0-9541-AD8C-01D6C4AD1D19}" type="datetimeFigureOut">
               <a:rPr lang="en-US" smtClean="0"/>
-              <a:t>7/14/25</a:t>
+              <a:t>7/15/25</a:t>
             </a:fld>
             <a:endParaRPr lang="en-US"/>
           </a:p>
@@ -1050,7 +1050,7 @@
           <a:p>
             <a:fld id="{EC529286-92C0-9541-AD8C-01D6C4AD1D19}" type="datetimeFigureOut">
               <a:rPr lang="en-AU" smtClean="0"/>
-              <a:t>14/7/2025</a:t>
+              <a:t>15/7/2025</a:t>
             </a:fld>
             <a:endParaRPr lang="en-AU" dirty="0"/>
           </a:p>
@@ -1321,7 +1321,7 @@
           <a:p>
             <a:fld id="{EC529286-92C0-9541-AD8C-01D6C4AD1D19}" type="datetimeFigureOut">
               <a:rPr lang="en-AU" smtClean="0"/>
-              <a:t>14/7/2025</a:t>
+              <a:t>15/7/2025</a:t>
             </a:fld>
             <a:endParaRPr lang="en-AU" dirty="0"/>
           </a:p>
@@ -1782,7 +1782,7 @@
           <a:p>
             <a:fld id="{EC529286-92C0-9541-AD8C-01D6C4AD1D19}" type="datetimeFigureOut">
               <a:rPr lang="en-AU" smtClean="0"/>
-              <a:t>14/7/2025</a:t>
+              <a:t>15/7/2025</a:t>
             </a:fld>
             <a:endParaRPr lang="en-AU" dirty="0"/>
           </a:p>
@@ -2075,7 +2075,7 @@
           <a:p>
             <a:fld id="{EC529286-92C0-9541-AD8C-01D6C4AD1D19}" type="datetimeFigureOut">
               <a:rPr lang="en-AU" smtClean="0"/>
-              <a:t>14/7/2025</a:t>
+              <a:t>15/7/2025</a:t>
             </a:fld>
             <a:endParaRPr lang="en-AU" dirty="0"/>
           </a:p>
@@ -3548,7 +3548,7 @@
           <a:p>
             <a:fld id="{EC529286-92C0-9541-AD8C-01D6C4AD1D19}" type="datetimeFigureOut">
               <a:rPr lang="en-AU" smtClean="0"/>
-              <a:t>14/7/2025</a:t>
+              <a:t>15/7/2025</a:t>
             </a:fld>
             <a:endParaRPr lang="en-AU" dirty="0"/>
           </a:p>
@@ -4860,7 +4860,7 @@
       </p:sp>
       <p:sp>
         <p:nvSpPr>
-          <p:cNvPr id="51" name="Title6">
+          <p:cNvPr id="51" name="Title4">
             <a:extLst>
               <a:ext uri="{FF2B5EF4-FFF2-40B4-BE49-F238E27FC236}">
                 <a16:creationId xmlns:a16="http://schemas.microsoft.com/office/drawing/2014/main" id="{0F680350-5C6D-05CD-2861-1CBCFF6E39DA}"/>
@@ -4952,7 +4952,7 @@
       </p:sp>
       <p:sp>
         <p:nvSpPr>
-          <p:cNvPr id="50" name="Content6">
+          <p:cNvPr id="50" name="Content4">
             <a:extLst>
               <a:ext uri="{FF2B5EF4-FFF2-40B4-BE49-F238E27FC236}">
                 <a16:creationId xmlns:a16="http://schemas.microsoft.com/office/drawing/2014/main" id="{66541D57-A12D-E924-D596-DE278CD7F4D7}"/>
@@ -5544,7 +5544,7 @@
       </p:sp>
       <p:sp>
         <p:nvSpPr>
-          <p:cNvPr id="41" name="Title4">
+          <p:cNvPr id="41" name="Title6">
             <a:extLst>
               <a:ext uri="{FF2B5EF4-FFF2-40B4-BE49-F238E27FC236}">
                 <a16:creationId xmlns:a16="http://schemas.microsoft.com/office/drawing/2014/main" id="{1580A2FB-D18E-CCE5-D7D5-AB29B0225C05}"/>
@@ -5636,7 +5636,7 @@
       </p:sp>
       <p:sp>
         <p:nvSpPr>
-          <p:cNvPr id="40" name="Content4">
+          <p:cNvPr id="40" name="Content6">
             <a:extLst>
               <a:ext uri="{FF2B5EF4-FFF2-40B4-BE49-F238E27FC236}">
                 <a16:creationId xmlns:a16="http://schemas.microsoft.com/office/drawing/2014/main" id="{8B832846-EB9F-5EFA-F397-ED05D7CD5CBB}"/>
@@ -6926,7 +6926,7 @@
           <a:p>
             <a:fld id="{EC529286-92C0-9541-AD8C-01D6C4AD1D19}" type="datetimeFigureOut">
               <a:rPr lang="en-AU" smtClean="0"/>
-              <a:t>14/7/2025</a:t>
+              <a:t>15/7/2025</a:t>
             </a:fld>
             <a:endParaRPr lang="en-AU" dirty="0"/>
           </a:p>
@@ -7173,7 +7173,7 @@
           <a:p>
             <a:fld id="{EC529286-92C0-9541-AD8C-01D6C4AD1D19}" type="datetimeFigureOut">
               <a:rPr lang="en-AU" smtClean="0"/>
-              <a:t>14/7/2025</a:t>
+              <a:t>15/7/2025</a:t>
             </a:fld>
             <a:endParaRPr lang="en-AU" dirty="0"/>
           </a:p>
@@ -7312,7 +7312,7 @@
           <a:p>
             <a:fld id="{626B0BCA-A8D4-8D47-B4D9-B8F6CDA51159}" type="datetimeFigureOut">
               <a:rPr lang="en-AU" smtClean="0"/>
-              <a:t>14/7/2025</a:t>
+              <a:t>15/7/2025</a:t>
             </a:fld>
             <a:endParaRPr lang="en-AU"/>
           </a:p>
@@ -7823,7 +7823,7 @@
           <a:p>
             <a:fld id="{EC529286-92C0-9541-AD8C-01D6C4AD1D19}" type="datetimeFigureOut">
               <a:rPr lang="en-US" smtClean="0"/>
-              <a:t>7/14/25</a:t>
+              <a:t>7/15/25</a:t>
             </a:fld>
             <a:endParaRPr lang="en-US"/>
           </a:p>
@@ -8098,7 +8098,7 @@
           <a:p>
             <a:fld id="{EC529286-92C0-9541-AD8C-01D6C4AD1D19}" type="datetimeFigureOut">
               <a:rPr lang="en-US" smtClean="0"/>
-              <a:t>7/14/25</a:t>
+              <a:t>7/15/25</a:t>
             </a:fld>
             <a:endParaRPr lang="en-US"/>
           </a:p>
@@ -8363,7 +8363,7 @@
           <a:p>
             <a:fld id="{EC529286-92C0-9541-AD8C-01D6C4AD1D19}" type="datetimeFigureOut">
               <a:rPr lang="en-US" smtClean="0"/>
-              <a:t>7/14/25</a:t>
+              <a:t>7/15/25</a:t>
             </a:fld>
             <a:endParaRPr lang="en-US"/>
           </a:p>
@@ -8775,7 +8775,7 @@
           <a:p>
             <a:fld id="{EC529286-92C0-9541-AD8C-01D6C4AD1D19}" type="datetimeFigureOut">
               <a:rPr lang="en-US" smtClean="0"/>
-              <a:t>7/14/25</a:t>
+              <a:t>7/15/25</a:t>
             </a:fld>
             <a:endParaRPr lang="en-US"/>
           </a:p>
@@ -8916,7 +8916,7 @@
           <a:p>
             <a:fld id="{EC529286-92C0-9541-AD8C-01D6C4AD1D19}" type="datetimeFigureOut">
               <a:rPr lang="en-US" smtClean="0"/>
-              <a:t>7/14/25</a:t>
+              <a:t>7/15/25</a:t>
             </a:fld>
             <a:endParaRPr lang="en-US"/>
           </a:p>
@@ -9029,7 +9029,7 @@
           <a:p>
             <a:fld id="{EC529286-92C0-9541-AD8C-01D6C4AD1D19}" type="datetimeFigureOut">
               <a:rPr lang="en-US" smtClean="0"/>
-              <a:t>7/14/25</a:t>
+              <a:t>7/15/25</a:t>
             </a:fld>
             <a:endParaRPr lang="en-US"/>
           </a:p>
@@ -9174,15 +9174,22 @@
         </p:nvSpPr>
         <p:spPr>
           <a:xfrm>
-            <a:off x="5183188" y="987425"/>
-            <a:ext cx="6172200" cy="4873625"/>
+            <a:off x="5183188" y="457201"/>
+            <a:ext cx="6172200" cy="5403850"/>
           </a:xfrm>
         </p:spPr>
         <p:txBody>
           <a:bodyPr/>
           <a:lstStyle>
             <a:lvl1pPr>
-              <a:defRPr sz="3200"/>
+              <a:defRPr lang="en-US" sz="1600" kern="1200" dirty="0">
+                <a:solidFill>
+                  <a:schemeClr val="tx1"/>
+                </a:solidFill>
+                <a:latin typeface="+mn-lt"/>
+                <a:ea typeface="+mn-ea"/>
+                <a:cs typeface="+mn-cs"/>
+              </a:defRPr>
             </a:lvl1pPr>
             <a:lvl2pPr>
               <a:defRPr sz="2800"/>
@@ -9210,38 +9217,19 @@
             </a:lvl9pPr>
           </a:lstStyle>
           <a:p>
-            <a:pPr lvl="0"/>
+            <a:pPr marL="0" lvl="0" indent="0" algn="l" defTabSz="914400" rtl="0" eaLnBrk="1" latinLnBrk="0" hangingPunct="1">
+              <a:lnSpc>
+                <a:spcPct val="90000"/>
+              </a:lnSpc>
+              <a:spcBef>
+                <a:spcPts val="1000"/>
+              </a:spcBef>
+              <a:buFontTx/>
+              <a:buNone/>
+            </a:pPr>
             <a:r>
-              <a:rPr lang="en-US"/>
+              <a:rPr lang="en-US" dirty="0"/>
               <a:t>Click to edit Master text styles</a:t>
-            </a:r>
-          </a:p>
-          <a:p>
-            <a:pPr lvl="1"/>
-            <a:r>
-              <a:rPr lang="en-US"/>
-              <a:t>Second level</a:t>
-            </a:r>
-          </a:p>
-          <a:p>
-            <a:pPr lvl="2"/>
-            <a:r>
-              <a:rPr lang="en-US"/>
-              <a:t>Third level</a:t>
-            </a:r>
-          </a:p>
-          <a:p>
-            <a:pPr lvl="3"/>
-            <a:r>
-              <a:rPr lang="en-US"/>
-              <a:t>Fourth level</a:t>
-            </a:r>
-          </a:p>
-          <a:p>
-            <a:pPr lvl="4"/>
-            <a:r>
-              <a:rPr lang="en-US"/>
-              <a:t>Fifth level</a:t>
             </a:r>
           </a:p>
         </p:txBody>
@@ -9311,7 +9299,7 @@
           <a:p>
             <a:pPr lvl="0"/>
             <a:r>
-              <a:rPr lang="en-US"/>
+              <a:rPr lang="en-US" dirty="0"/>
               <a:t>Click to edit Master text styles</a:t>
             </a:r>
           </a:p>
@@ -9340,7 +9328,7 @@
           <a:p>
             <a:fld id="{EC529286-92C0-9541-AD8C-01D6C4AD1D19}" type="datetimeFigureOut">
               <a:rPr lang="en-US" smtClean="0"/>
-              <a:t>7/14/25</a:t>
+              <a:t>7/15/25</a:t>
             </a:fld>
             <a:endParaRPr lang="en-US"/>
           </a:p>
@@ -9628,7 +9616,7 @@
           <a:p>
             <a:fld id="{EC529286-92C0-9541-AD8C-01D6C4AD1D19}" type="datetimeFigureOut">
               <a:rPr lang="en-US" smtClean="0"/>
-              <a:t>7/14/25</a:t>
+              <a:t>7/15/25</a:t>
             </a:fld>
             <a:endParaRPr lang="en-US"/>
           </a:p>
@@ -9869,7 +9857,7 @@
           <a:p>
             <a:fld id="{EC529286-92C0-9541-AD8C-01D6C4AD1D19}" type="datetimeFigureOut">
               <a:rPr lang="en-US" smtClean="0"/>
-              <a:t>7/14/25</a:t>
+              <a:t>7/15/25</a:t>
             </a:fld>
             <a:endParaRPr lang="en-US"/>
           </a:p>

</xml_diff>

<commit_message>
Update template and structured frontmatter patterns
- Update default.pptx template with placeholder improvements
- Enhance title_and_6_item_lists pattern and test files
- Improve pattern examples and validation

Template and pattern updates for better placeholder compatibility.

🤖 Generated with [Claude Code](https://claude.ai/code)

Co-Authored-By: Claude <noreply@anthropic.com>
</commit_message>
<xml_diff>
--- a/src/deckbuilder/assets/templates/default.pptx
+++ b/src/deckbuilder/assets/templates/default.pptx
@@ -256,7 +256,7 @@
           <a:p>
             <a:fld id="{EC529286-92C0-9541-AD8C-01D6C4AD1D19}" type="datetimeFigureOut">
               <a:rPr lang="en-US" smtClean="0"/>
-              <a:t>8/16/25</a:t>
+              <a:t>8/19/25</a:t>
             </a:fld>
             <a:endParaRPr lang="en-US"/>
           </a:p>
@@ -470,7 +470,7 @@
           <a:p>
             <a:fld id="{EC529286-92C0-9541-AD8C-01D6C4AD1D19}" type="datetimeFigureOut">
               <a:rPr lang="en-US" smtClean="0"/>
-              <a:t>8/16/25</a:t>
+              <a:t>8/19/25</a:t>
             </a:fld>
             <a:endParaRPr lang="en-US"/>
           </a:p>
@@ -678,7 +678,7 @@
           <a:p>
             <a:fld id="{EC529286-92C0-9541-AD8C-01D6C4AD1D19}" type="datetimeFigureOut">
               <a:rPr lang="en-US" smtClean="0"/>
-              <a:t>8/16/25</a:t>
+              <a:t>8/19/25</a:t>
             </a:fld>
             <a:endParaRPr lang="en-US"/>
           </a:p>
@@ -1047,7 +1047,7 @@
           <a:p>
             <a:fld id="{EC529286-92C0-9541-AD8C-01D6C4AD1D19}" type="datetimeFigureOut">
               <a:rPr lang="en-AU" smtClean="0"/>
-              <a:t>16/8/2025</a:t>
+              <a:t>19/8/2025</a:t>
             </a:fld>
             <a:endParaRPr lang="en-AU" dirty="0"/>
           </a:p>
@@ -1318,7 +1318,7 @@
           <a:p>
             <a:fld id="{EC529286-92C0-9541-AD8C-01D6C4AD1D19}" type="datetimeFigureOut">
               <a:rPr lang="en-AU" smtClean="0"/>
-              <a:t>16/8/2025</a:t>
+              <a:t>19/8/2025</a:t>
             </a:fld>
             <a:endParaRPr lang="en-AU" dirty="0"/>
           </a:p>
@@ -1779,7 +1779,7 @@
           <a:p>
             <a:fld id="{EC529286-92C0-9541-AD8C-01D6C4AD1D19}" type="datetimeFigureOut">
               <a:rPr lang="en-AU" smtClean="0"/>
-              <a:t>16/8/2025</a:t>
+              <a:t>19/8/2025</a:t>
             </a:fld>
             <a:endParaRPr lang="en-AU" dirty="0"/>
           </a:p>
@@ -2072,7 +2072,7 @@
           <a:p>
             <a:fld id="{EC529286-92C0-9541-AD8C-01D6C4AD1D19}" type="datetimeFigureOut">
               <a:rPr lang="en-AU" smtClean="0"/>
-              <a:t>16/8/2025</a:t>
+              <a:t>19/8/2025</a:t>
             </a:fld>
             <a:endParaRPr lang="en-AU" dirty="0"/>
           </a:p>
@@ -3545,7 +3545,7 @@
           <a:p>
             <a:fld id="{EC529286-92C0-9541-AD8C-01D6C4AD1D19}" type="datetimeFigureOut">
               <a:rPr lang="en-AU" smtClean="0"/>
-              <a:t>16/8/2025</a:t>
+              <a:t>19/8/2025</a:t>
             </a:fld>
             <a:endParaRPr lang="en-AU" dirty="0"/>
           </a:p>
@@ -3647,7 +3647,7 @@
       </p:grpSpPr>
       <p:sp>
         <p:nvSpPr>
-          <p:cNvPr id="2" name="slide_title">
+          <p:cNvPr id="2" name="title_top">
             <a:extLst>
               <a:ext uri="{FF2B5EF4-FFF2-40B4-BE49-F238E27FC236}">
                 <a16:creationId xmlns:a16="http://schemas.microsoft.com/office/drawing/2014/main" id="{666A9F42-7FF7-F803-C075-BC4968D35E34}"/>
@@ -6923,7 +6923,7 @@
           <a:p>
             <a:fld id="{EC529286-92C0-9541-AD8C-01D6C4AD1D19}" type="datetimeFigureOut">
               <a:rPr lang="en-AU" smtClean="0"/>
-              <a:t>16/8/2025</a:t>
+              <a:t>19/8/2025</a:t>
             </a:fld>
             <a:endParaRPr lang="en-AU" dirty="0"/>
           </a:p>
@@ -7170,7 +7170,7 @@
           <a:p>
             <a:fld id="{EC529286-92C0-9541-AD8C-01D6C4AD1D19}" type="datetimeFigureOut">
               <a:rPr lang="en-AU" smtClean="0"/>
-              <a:t>16/8/2025</a:t>
+              <a:t>19/8/2025</a:t>
             </a:fld>
             <a:endParaRPr lang="en-AU" dirty="0"/>
           </a:p>
@@ -7309,7 +7309,7 @@
           <a:p>
             <a:fld id="{626B0BCA-A8D4-8D47-B4D9-B8F6CDA51159}" type="datetimeFigureOut">
               <a:rPr lang="en-AU" smtClean="0"/>
-              <a:t>16/8/2025</a:t>
+              <a:t>19/8/2025</a:t>
             </a:fld>
             <a:endParaRPr lang="en-AU"/>
           </a:p>
@@ -7820,7 +7820,7 @@
           <a:p>
             <a:fld id="{EC529286-92C0-9541-AD8C-01D6C4AD1D19}" type="datetimeFigureOut">
               <a:rPr lang="en-US" smtClean="0"/>
-              <a:t>8/16/25</a:t>
+              <a:t>8/19/25</a:t>
             </a:fld>
             <a:endParaRPr lang="en-US"/>
           </a:p>
@@ -7991,7 +7991,7 @@
           <a:p>
             <a:fld id="{EC529286-92C0-9541-AD8C-01D6C4AD1D19}" type="datetimeFigureOut">
               <a:rPr lang="en-US" smtClean="0"/>
-              <a:t>8/16/25</a:t>
+              <a:t>8/19/25</a:t>
             </a:fld>
             <a:endParaRPr lang="en-US"/>
           </a:p>
@@ -8200,7 +8200,7 @@
           <a:p>
             <a:fld id="{EC529286-92C0-9541-AD8C-01D6C4AD1D19}" type="datetimeFigureOut">
               <a:rPr lang="en-US" smtClean="0"/>
-              <a:t>8/16/25</a:t>
+              <a:t>8/19/25</a:t>
             </a:fld>
             <a:endParaRPr lang="en-US"/>
           </a:p>
@@ -8447,7 +8447,7 @@
           <a:p>
             <a:fld id="{EC529286-92C0-9541-AD8C-01D6C4AD1D19}" type="datetimeFigureOut">
               <a:rPr lang="en-US" smtClean="0"/>
-              <a:t>8/16/25</a:t>
+              <a:t>8/19/25</a:t>
             </a:fld>
             <a:endParaRPr lang="en-US"/>
           </a:p>
@@ -8656,7 +8656,7 @@
           <a:p>
             <a:fld id="{EC529286-92C0-9541-AD8C-01D6C4AD1D19}" type="datetimeFigureOut">
               <a:rPr lang="en-US" smtClean="0"/>
-              <a:t>8/16/25</a:t>
+              <a:t>8/19/25</a:t>
             </a:fld>
             <a:endParaRPr lang="en-US"/>
           </a:p>
@@ -8971,7 +8971,7 @@
           <a:p>
             <a:fld id="{EC529286-92C0-9541-AD8C-01D6C4AD1D19}" type="datetimeFigureOut">
               <a:rPr lang="en-US" smtClean="0"/>
-              <a:t>8/16/25</a:t>
+              <a:t>8/19/25</a:t>
             </a:fld>
             <a:endParaRPr lang="en-US"/>
           </a:p>
@@ -9246,7 +9246,7 @@
           <a:p>
             <a:fld id="{EC529286-92C0-9541-AD8C-01D6C4AD1D19}" type="datetimeFigureOut">
               <a:rPr lang="en-US" smtClean="0"/>
-              <a:t>8/16/25</a:t>
+              <a:t>8/19/25</a:t>
             </a:fld>
             <a:endParaRPr lang="en-US"/>
           </a:p>
@@ -9511,7 +9511,7 @@
           <a:p>
             <a:fld id="{EC529286-92C0-9541-AD8C-01D6C4AD1D19}" type="datetimeFigureOut">
               <a:rPr lang="en-US" smtClean="0"/>
-              <a:t>8/16/25</a:t>
+              <a:t>8/19/25</a:t>
             </a:fld>
             <a:endParaRPr lang="en-US"/>
           </a:p>
@@ -9923,7 +9923,7 @@
           <a:p>
             <a:fld id="{EC529286-92C0-9541-AD8C-01D6C4AD1D19}" type="datetimeFigureOut">
               <a:rPr lang="en-US" smtClean="0"/>
-              <a:t>8/16/25</a:t>
+              <a:t>8/19/25</a:t>
             </a:fld>
             <a:endParaRPr lang="en-US"/>
           </a:p>
@@ -10064,7 +10064,7 @@
           <a:p>
             <a:fld id="{EC529286-92C0-9541-AD8C-01D6C4AD1D19}" type="datetimeFigureOut">
               <a:rPr lang="en-US" smtClean="0"/>
-              <a:t>8/16/25</a:t>
+              <a:t>8/19/25</a:t>
             </a:fld>
             <a:endParaRPr lang="en-US"/>
           </a:p>
@@ -10177,7 +10177,7 @@
           <a:p>
             <a:fld id="{EC529286-92C0-9541-AD8C-01D6C4AD1D19}" type="datetimeFigureOut">
               <a:rPr lang="en-US" smtClean="0"/>
-              <a:t>8/16/25</a:t>
+              <a:t>8/19/25</a:t>
             </a:fld>
             <a:endParaRPr lang="en-US"/>
           </a:p>
@@ -10476,7 +10476,7 @@
           <a:p>
             <a:fld id="{EC529286-92C0-9541-AD8C-01D6C4AD1D19}" type="datetimeFigureOut">
               <a:rPr lang="en-US" smtClean="0"/>
-              <a:t>8/16/25</a:t>
+              <a:t>8/19/25</a:t>
             </a:fld>
             <a:endParaRPr lang="en-US"/>
           </a:p>
@@ -10764,7 +10764,7 @@
           <a:p>
             <a:fld id="{EC529286-92C0-9541-AD8C-01D6C4AD1D19}" type="datetimeFigureOut">
               <a:rPr lang="en-US" smtClean="0"/>
-              <a:t>8/16/25</a:t>
+              <a:t>8/19/25</a:t>
             </a:fld>
             <a:endParaRPr lang="en-US"/>
           </a:p>
@@ -11005,7 +11005,7 @@
           <a:p>
             <a:fld id="{EC529286-92C0-9541-AD8C-01D6C4AD1D19}" type="datetimeFigureOut">
               <a:rPr lang="en-US" smtClean="0"/>
-              <a:t>8/16/25</a:t>
+              <a:t>8/19/25</a:t>
             </a:fld>
             <a:endParaRPr lang="en-US"/>
           </a:p>

</xml_diff>